<commit_message>
Cleaned up a number of the slide notes, added comments for Heidi asking for clarification.  Nothing removed, added or significantly altered for presentation.
</commit_message>
<xml_diff>
--- a/Digital Product Innovation in the Public Service-TRAN.pptx
+++ b/Digital Product Innovation in the Public Service-TRAN.pptx
@@ -133,7 +133,7 @@
   </p:defaultTextStyle>
   <p:extLst>
     <p:ext uri="{EFAFB233-063F-42B5-8137-9DF3F51BA10A}">
-      <p15:sldGuideLst xmlns:p15="http://schemas.microsoft.com/office/powerpoint/2012/main">
+      <p15:sldGuideLst xmlns="" xmlns:p15="http://schemas.microsoft.com/office/powerpoint/2012/main">
         <p15:guide id="1" orient="horz" pos="2160">
           <p15:clr>
             <a:srgbClr val="A4A3A4"/>
@@ -232,7 +232,7 @@
           <a:p>
             <a:fld id="{4FE63C12-9747-4331-AD85-87339BD4C845}" type="datetimeFigureOut">
               <a:rPr lang="en-CA" smtClean="0"/>
-              <a:t>06/11/2017</a:t>
+              <a:t>2017-11-15</a:t>
             </a:fld>
             <a:endParaRPr lang="en-CA"/>
           </a:p>
@@ -545,18 +545,22 @@
           <a:lstStyle/>
           <a:p>
             <a:r>
-              <a:rPr lang="en-CA" dirty="0" smtClean="0"/>
-              <a:t>Provide thanks to the CSI</a:t>
+              <a:rPr lang="en-CA" dirty="0" err="1" smtClean="0"/>
+              <a:t>Originaly</a:t>
+            </a:r>
+            <a:r>
+              <a:rPr lang="en-CA" dirty="0" smtClean="0"/>
+              <a:t> version</a:t>
             </a:r>
             <a:r>
               <a:rPr lang="en-CA" baseline="0" dirty="0" smtClean="0"/>
-              <a:t> lab for hosting and all </a:t>
-            </a:r>
-            <a:r>
-              <a:rPr lang="en-CA" baseline="0" smtClean="0"/>
-              <a:t>for coming.</a:t>
-            </a:r>
-            <a:endParaRPr lang="en-CA"/>
+              <a:t> </a:t>
+            </a:r>
+            <a:r>
+              <a:rPr lang="en-CA" dirty="0" smtClean="0"/>
+              <a:t>presented by Heidi Leckenby to a CSI Labs Lunch and Lab.</a:t>
+            </a:r>
+            <a:endParaRPr lang="en-CA" dirty="0"/>
           </a:p>
         </p:txBody>
       </p:sp>
@@ -1484,12 +1488,12 @@
               <a:t>Build into the foundations of how you code the basics to enable tab navigation and </a:t>
             </a:r>
             <a:r>
-              <a:rPr lang="en-CA" dirty="0" err="1" smtClean="0"/>
-              <a:t>screenreader</a:t>
-            </a:r>
-            <a:r>
-              <a:rPr lang="en-CA" dirty="0" smtClean="0"/>
-              <a:t> interaction</a:t>
+              <a:rPr lang="en-CA" dirty="0" smtClean="0"/>
+              <a:t>screen reader </a:t>
+            </a:r>
+            <a:r>
+              <a:rPr lang="en-CA" dirty="0" smtClean="0"/>
+              <a:t>interaction</a:t>
             </a:r>
           </a:p>
           <a:p>
@@ -1829,7 +1833,7 @@
           <a:bodyPr/>
           <a:lstStyle/>
           <a:p>
-            <a:endParaRPr lang="en-CA"/>
+            <a:endParaRPr lang="en-CA" dirty="0"/>
           </a:p>
         </p:txBody>
       </p:sp>
@@ -1913,7 +1917,42 @@
           <a:bodyPr/>
           <a:lstStyle/>
           <a:p>
-            <a:endParaRPr lang="en-CA"/>
+            <a:r>
+              <a:rPr lang="en-CA" dirty="0" smtClean="0"/>
+              <a:t>I don’t know how we might address automated testing.  </a:t>
+            </a:r>
+          </a:p>
+          <a:p>
+            <a:endParaRPr lang="en-CA" dirty="0" smtClean="0"/>
+          </a:p>
+          <a:p>
+            <a:r>
+              <a:rPr lang="en-CA" dirty="0" smtClean="0"/>
+              <a:t>Some work has been done on this in</a:t>
+            </a:r>
+            <a:r>
+              <a:rPr lang="en-CA" baseline="0" dirty="0" smtClean="0"/>
+              <a:t> the last couple of years</a:t>
+            </a:r>
+          </a:p>
+          <a:p>
+            <a:r>
+              <a:rPr lang="en-CA" baseline="0" dirty="0"/>
+              <a:t>	</a:t>
+            </a:r>
+            <a:r>
+              <a:rPr lang="en-CA" baseline="0" dirty="0" smtClean="0"/>
+              <a:t>mostly by jury rigging unit test code acquired from Google Chrome GitHub repo – but this wasn’t the intent of that </a:t>
+            </a:r>
+          </a:p>
+          <a:p>
+            <a:endParaRPr lang="en-CA" baseline="0" dirty="0" smtClean="0"/>
+          </a:p>
+          <a:p>
+            <a:r>
+              <a:rPr lang="en-CA" baseline="0" dirty="0" smtClean="0"/>
+              <a:t>No manual or automated testing is a substitute for user test – NOT business acceptance testing (most commonly used for UAT)</a:t>
+            </a:r>
           </a:p>
         </p:txBody>
       </p:sp>
@@ -1997,22 +2036,6 @@
           <a:bodyPr/>
           <a:lstStyle/>
           <a:p>
-            <a:r>
-              <a:rPr lang="en-CA" dirty="0" smtClean="0"/>
-              <a:t>Rommel,</a:t>
-            </a:r>
-            <a:r>
-              <a:rPr lang="en-CA" baseline="0" dirty="0" smtClean="0"/>
-              <a:t> here’s where some great information can be provided on the SD project and </a:t>
-            </a:r>
-            <a:r>
-              <a:rPr lang="en-CA" baseline="0" dirty="0" err="1" smtClean="0"/>
-              <a:t>segway</a:t>
-            </a:r>
-            <a:r>
-              <a:rPr lang="en-CA" baseline="0" dirty="0" smtClean="0"/>
-              <a:t> over to Greg and MSP.</a:t>
-            </a:r>
             <a:endParaRPr lang="en-CA" dirty="0"/>
           </a:p>
         </p:txBody>
@@ -2097,7 +2120,46 @@
           <a:bodyPr/>
           <a:lstStyle/>
           <a:p>
-            <a:endParaRPr lang="en-CA"/>
+            <a:pPr marL="0" marR="0" indent="0" algn="l" defTabSz="914400" rtl="0" eaLnBrk="1" fontAlgn="auto" latinLnBrk="0" hangingPunct="1">
+              <a:lnSpc>
+                <a:spcPct val="100000"/>
+              </a:lnSpc>
+              <a:spcBef>
+                <a:spcPts val="0"/>
+              </a:spcBef>
+              <a:spcAft>
+                <a:spcPts val="0"/>
+              </a:spcAft>
+              <a:buClrTx/>
+              <a:buSzTx/>
+              <a:buFontTx/>
+              <a:buNone/>
+              <a:tabLst/>
+              <a:defRPr/>
+            </a:pPr>
+            <a:r>
+              <a:rPr lang="en-CA" dirty="0" smtClean="0"/>
+              <a:t>Rommel,</a:t>
+            </a:r>
+            <a:r>
+              <a:rPr lang="en-CA" baseline="0" dirty="0" smtClean="0"/>
+              <a:t> here’s where some great information can be provided on the SD project and segue over to Greg and MSP.</a:t>
+            </a:r>
+          </a:p>
+          <a:p>
+            <a:endParaRPr lang="en-CA" dirty="0" smtClean="0"/>
+          </a:p>
+          <a:p>
+            <a:endParaRPr lang="en-CA" baseline="0" dirty="0" smtClean="0"/>
+          </a:p>
+          <a:p>
+            <a:r>
+              <a:rPr lang="en-CA" baseline="0" dirty="0" smtClean="0"/>
+              <a:t>NOT NEEDED lets show 1 good example …. And one bad one (DriveBC !!)</a:t>
+            </a:r>
+          </a:p>
+          <a:p>
+            <a:endParaRPr lang="en-CA" dirty="0"/>
           </a:p>
         </p:txBody>
       </p:sp>
@@ -2181,7 +2243,7 @@
           <a:bodyPr/>
           <a:lstStyle/>
           <a:p>
-            <a:endParaRPr lang="en-CA"/>
+            <a:endParaRPr lang="en-CA" dirty="0"/>
           </a:p>
         </p:txBody>
       </p:sp>
@@ -2265,7 +2327,7 @@
           <a:bodyPr/>
           <a:lstStyle/>
           <a:p>
-            <a:endParaRPr lang="en-CA"/>
+            <a:endParaRPr lang="en-CA" dirty="0"/>
           </a:p>
         </p:txBody>
       </p:sp>
@@ -2349,7 +2411,7 @@
           <a:bodyPr/>
           <a:lstStyle/>
           <a:p>
-            <a:endParaRPr lang="en-CA"/>
+            <a:endParaRPr lang="en-CA" dirty="0"/>
           </a:p>
         </p:txBody>
       </p:sp>
@@ -2479,6 +2541,41 @@
               </a:rPr>
               <a:t>• have a severe mental or physical impairment that, in a medical doctor’s opinion, will likely continue for at least two or more years. </a:t>
             </a:r>
+          </a:p>
+          <a:p>
+            <a:endParaRPr lang="en-CA" sz="1200" b="0" i="0" u="none" strike="noStrike" kern="1200" baseline="0" dirty="0" smtClean="0">
+              <a:solidFill>
+                <a:schemeClr val="tx1"/>
+              </a:solidFill>
+              <a:latin typeface="+mn-lt"/>
+              <a:ea typeface="+mn-ea"/>
+              <a:cs typeface="+mn-cs"/>
+            </a:endParaRPr>
+          </a:p>
+          <a:p>
+            <a:pPr marL="0" marR="0" indent="0" algn="l" defTabSz="914400" rtl="0" eaLnBrk="1" fontAlgn="auto" latinLnBrk="0" hangingPunct="1">
+              <a:lnSpc>
+                <a:spcPct val="100000"/>
+              </a:lnSpc>
+              <a:spcBef>
+                <a:spcPts val="0"/>
+              </a:spcBef>
+              <a:spcAft>
+                <a:spcPts val="0"/>
+              </a:spcAft>
+              <a:buClrTx/>
+              <a:buSzTx/>
+              <a:buFontTx/>
+              <a:buNone/>
+              <a:tabLst/>
+              <a:defRPr/>
+            </a:pPr>
+            <a:r>
+              <a:rPr lang="en-CA" dirty="0" smtClean="0"/>
+              <a:t>US identifies approximately 25% of its population.</a:t>
+            </a:r>
+          </a:p>
+          <a:p>
             <a:endParaRPr lang="en-CA" dirty="0"/>
           </a:p>
         </p:txBody>
@@ -2601,12 +2698,8 @@
           </a:p>
           <a:p>
             <a:r>
-              <a:rPr lang="en-CA" baseline="0" dirty="0" err="1" smtClean="0"/>
-              <a:t>Boarderline</a:t>
-            </a:r>
-            <a:r>
               <a:rPr lang="en-CA" baseline="0" dirty="0" smtClean="0"/>
-              <a:t> and don’t qualify for PWD</a:t>
+              <a:t>Borderline and don’t qualify for PWD</a:t>
             </a:r>
             <a:endParaRPr lang="en-CA" dirty="0" smtClean="0"/>
           </a:p>
@@ -2764,37 +2857,49 @@
               <a:t> is a higher </a:t>
             </a:r>
             <a:r>
-              <a:rPr lang="en-CA" baseline="0" dirty="0" err="1" smtClean="0"/>
-              <a:t>prevelance</a:t>
-            </a:r>
-            <a:r>
               <a:rPr lang="en-CA" baseline="0" dirty="0" smtClean="0"/>
-              <a:t> of users with learning/reading/cognitive barriers than there are blind. In fact colour blindness and </a:t>
-            </a:r>
-            <a:r>
-              <a:rPr lang="en-CA" baseline="0" dirty="0" err="1" smtClean="0"/>
-              <a:t>dislexia</a:t>
+              <a:t>prevalence </a:t>
             </a:r>
             <a:r>
               <a:rPr lang="en-CA" baseline="0" dirty="0" smtClean="0"/>
-              <a:t> are more common than blindness as well BUT we know how to code for </a:t>
-            </a:r>
-            <a:r>
-              <a:rPr lang="en-CA" baseline="0" dirty="0" err="1" smtClean="0"/>
-              <a:t>screenreaders</a:t>
+              <a:t>of users with learning/reading/cognitive barriers than there are blind. In fact colour blindness and </a:t>
             </a:r>
             <a:r>
               <a:rPr lang="en-CA" baseline="0" dirty="0" smtClean="0"/>
-              <a:t>.</a:t>
-            </a:r>
-          </a:p>
-          <a:p>
+              <a:t>dyslexia </a:t>
+            </a:r>
+            <a:r>
+              <a:rPr lang="en-CA" baseline="0" dirty="0" smtClean="0"/>
+              <a:t>are more common than blindness as well BUT we know how to code for </a:t>
+            </a:r>
+            <a:r>
+              <a:rPr lang="en-CA" baseline="0" dirty="0" smtClean="0"/>
+              <a:t>screen readers.</a:t>
+            </a:r>
             <a:endParaRPr lang="en-CA" baseline="0" dirty="0" smtClean="0"/>
           </a:p>
           <a:p>
+            <a:endParaRPr lang="en-CA" baseline="0" dirty="0" smtClean="0"/>
+          </a:p>
+          <a:p>
             <a:r>
               <a:rPr lang="en-CA" baseline="0" dirty="0" smtClean="0"/>
-              <a:t>Why do we think of blind or deaf as the most common? Advocates … businesses, technology, it’s more “in your face”</a:t>
+              <a:t>Why do we think of blind or deaf as the most common? </a:t>
+            </a:r>
+            <a:endParaRPr lang="en-CA" baseline="0" dirty="0" smtClean="0"/>
+          </a:p>
+          <a:p>
+            <a:r>
+              <a:rPr lang="en-CA" baseline="0" dirty="0" smtClean="0"/>
+              <a:t>Advocates </a:t>
+            </a:r>
+            <a:r>
+              <a:rPr lang="en-CA" baseline="0" dirty="0" smtClean="0"/>
+              <a:t>… businesses, technology, it’s more “in your face</a:t>
+            </a:r>
+            <a:r>
+              <a:rPr lang="en-CA" baseline="0" dirty="0" smtClean="0"/>
+              <a:t>”  (HEIDI: Can we refine this – I’m not sure what this is meant to convey?)</a:t>
             </a:r>
             <a:endParaRPr lang="en-CA" dirty="0" smtClean="0"/>
           </a:p>
@@ -3025,13 +3130,24 @@
             </a:r>
             <a:r>
               <a:rPr lang="en-CA" baseline="0" dirty="0" smtClean="0"/>
-              <a:t> in the previous slide through disabilities, we are catering for all users which could come from differing cultures, socioeconomic differences, location …</a:t>
-            </a:r>
-          </a:p>
-          <a:p>
+              <a:t> in the previous slide through disabilities, we are catering for all users which could come from differing cultures, socioeconomic differences, location </a:t>
+            </a:r>
+            <a:r>
+              <a:rPr lang="en-CA" baseline="0" dirty="0" smtClean="0"/>
+              <a:t>…</a:t>
+            </a:r>
+          </a:p>
+          <a:p>
+            <a:r>
+              <a:rPr lang="en-CA" baseline="0" dirty="0" smtClean="0"/>
+              <a:t>(HEIDI – previous slide? )</a:t>
+            </a:r>
             <a:endParaRPr lang="en-CA" baseline="0" dirty="0" smtClean="0"/>
           </a:p>
           <a:p>
+            <a:endParaRPr lang="en-CA" baseline="0" dirty="0" smtClean="0"/>
+          </a:p>
+          <a:p>
             <a:r>
               <a:rPr lang="en-CA" dirty="0" smtClean="0"/>
               <a:t>Other considerations of accessibility relate to:</a:t>
@@ -3055,12 +3171,12 @@
               <a:t>Persons in </a:t>
             </a:r>
             <a:r>
-              <a:rPr lang="en-CA" dirty="0" err="1" smtClean="0"/>
-              <a:t>differingly</a:t>
-            </a:r>
-            <a:r>
-              <a:rPr lang="en-CA" dirty="0" smtClean="0"/>
-              <a:t> governed environments (First Nations)</a:t>
+              <a:rPr lang="en-CA" dirty="0" smtClean="0"/>
+              <a:t>differently </a:t>
+            </a:r>
+            <a:r>
+              <a:rPr lang="en-CA" dirty="0" smtClean="0"/>
+              <a:t>governed environments (First Nations)</a:t>
             </a:r>
           </a:p>
           <a:p>
@@ -3870,7 +3986,7 @@
           <a:p>
             <a:fld id="{5DDB1DE6-DCFF-48D7-9CC0-C561253D4BC1}" type="datetimeFigureOut">
               <a:rPr lang="en-CA" smtClean="0"/>
-              <a:t>06/11/2017</a:t>
+              <a:t>2017-11-15</a:t>
             </a:fld>
             <a:endParaRPr lang="en-CA"/>
           </a:p>
@@ -4074,7 +4190,7 @@
           <a:p>
             <a:fld id="{5DDB1DE6-DCFF-48D7-9CC0-C561253D4BC1}" type="datetimeFigureOut">
               <a:rPr lang="en-CA" smtClean="0"/>
-              <a:t>06/11/2017</a:t>
+              <a:t>2017-11-15</a:t>
             </a:fld>
             <a:endParaRPr lang="en-CA"/>
           </a:p>
@@ -4272,7 +4388,7 @@
           <a:p>
             <a:fld id="{5DDB1DE6-DCFF-48D7-9CC0-C561253D4BC1}" type="datetimeFigureOut">
               <a:rPr lang="en-CA" smtClean="0"/>
-              <a:t>06/11/2017</a:t>
+              <a:t>2017-11-15</a:t>
             </a:fld>
             <a:endParaRPr lang="en-CA"/>
           </a:p>
@@ -4590,7 +4706,7 @@
           <a:p>
             <a:fld id="{5DDB1DE6-DCFF-48D7-9CC0-C561253D4BC1}" type="datetimeFigureOut">
               <a:rPr lang="en-CA" smtClean="0"/>
-              <a:t>06/11/2017</a:t>
+              <a:t>2017-11-15</a:t>
             </a:fld>
             <a:endParaRPr lang="en-CA"/>
           </a:p>
@@ -4902,7 +5018,7 @@
           <a:p>
             <a:fld id="{5DDB1DE6-DCFF-48D7-9CC0-C561253D4BC1}" type="datetimeFigureOut">
               <a:rPr lang="en-CA" smtClean="0"/>
-              <a:t>06/11/2017</a:t>
+              <a:t>2017-11-15</a:t>
             </a:fld>
             <a:endParaRPr lang="en-CA"/>
           </a:p>
@@ -5348,7 +5464,7 @@
           <a:p>
             <a:fld id="{5DDB1DE6-DCFF-48D7-9CC0-C561253D4BC1}" type="datetimeFigureOut">
               <a:rPr lang="en-CA" smtClean="0"/>
-              <a:t>06/11/2017</a:t>
+              <a:t>2017-11-15</a:t>
             </a:fld>
             <a:endParaRPr lang="en-CA"/>
           </a:p>
@@ -5490,7 +5606,7 @@
           <a:p>
             <a:fld id="{5DDB1DE6-DCFF-48D7-9CC0-C561253D4BC1}" type="datetimeFigureOut">
               <a:rPr lang="en-CA" smtClean="0"/>
-              <a:t>06/11/2017</a:t>
+              <a:t>2017-11-15</a:t>
             </a:fld>
             <a:endParaRPr lang="en-CA"/>
           </a:p>
@@ -5609,7 +5725,7 @@
           <a:p>
             <a:fld id="{5DDB1DE6-DCFF-48D7-9CC0-C561253D4BC1}" type="datetimeFigureOut">
               <a:rPr lang="en-CA" smtClean="0"/>
-              <a:t>06/11/2017</a:t>
+              <a:t>2017-11-15</a:t>
             </a:fld>
             <a:endParaRPr lang="en-CA"/>
           </a:p>
@@ -5910,7 +6026,7 @@
           <a:p>
             <a:fld id="{5DDB1DE6-DCFF-48D7-9CC0-C561253D4BC1}" type="datetimeFigureOut">
               <a:rPr lang="en-CA" smtClean="0"/>
-              <a:t>06/11/2017</a:t>
+              <a:t>2017-11-15</a:t>
             </a:fld>
             <a:endParaRPr lang="en-CA"/>
           </a:p>
@@ -6187,7 +6303,7 @@
           <a:p>
             <a:fld id="{5DDB1DE6-DCFF-48D7-9CC0-C561253D4BC1}" type="datetimeFigureOut">
               <a:rPr lang="en-CA" smtClean="0"/>
-              <a:t>06/11/2017</a:t>
+              <a:t>2017-11-15</a:t>
             </a:fld>
             <a:endParaRPr lang="en-CA"/>
           </a:p>
@@ -9087,7 +9203,7 @@
           <a:p>
             <a:r>
               <a:rPr lang="en-CA" dirty="0" smtClean="0"/>
-              <a:t>Today’s Lunch &amp; Lab</a:t>
+              <a:t>Overview</a:t>
             </a:r>
             <a:endParaRPr lang="en-CA" dirty="0"/>
           </a:p>
@@ -10487,8 +10603,8 @@
         </p:nvSpPr>
         <p:spPr>
           <a:xfrm>
-            <a:off x="3635896" y="1484784"/>
-            <a:ext cx="5256584" cy="4869418"/>
+            <a:off x="2555776" y="1916832"/>
+            <a:ext cx="4341894" cy="2553891"/>
           </a:xfrm>
           <a:prstGeom prst="roundRect">
             <a:avLst/>
@@ -10516,7 +10632,7 @@
           <a:p>
             <a:pPr algn="ctr"/>
             <a:r>
-              <a:rPr lang="en-CA" sz="8800" b="1" dirty="0" smtClean="0">
+              <a:rPr lang="en-CA" sz="4800" b="1" dirty="0" smtClean="0">
                 <a:ln w="19050">
                   <a:solidFill>
                     <a:schemeClr val="tx2">
@@ -10544,7 +10660,7 @@
           </a:p>
           <a:p>
             <a:r>
-              <a:rPr lang="en-CA" sz="4800" dirty="0" smtClean="0">
+              <a:rPr lang="en-CA" sz="3200" dirty="0" smtClean="0">
                 <a:solidFill>
                   <a:schemeClr val="accent6">
                     <a:lumMod val="75000"/>
@@ -10553,7 +10669,7 @@
               </a:rPr>
               <a:t>What do you think are the most prevalent disabilities?</a:t>
             </a:r>
-            <a:endParaRPr lang="en-CA" sz="4800" dirty="0">
+            <a:endParaRPr lang="en-CA" sz="3200" dirty="0">
               <a:solidFill>
                 <a:schemeClr val="accent6">
                   <a:lumMod val="75000"/>
@@ -10833,7 +10949,19 @@
             </a:pPr>
             <a:r>
               <a:rPr lang="en-CA" dirty="0" smtClean="0"/>
-              <a:t>… the flexibility to accommodate each user’s needs and preferences when interacting with products, services and environments</a:t>
+              <a:t>… the flexibility to accommodate </a:t>
+            </a:r>
+            <a:r>
+              <a:rPr lang="en-CA" dirty="0" smtClean="0"/>
+              <a:t>every user’s </a:t>
+            </a:r>
+            <a:r>
+              <a:rPr lang="en-CA" dirty="0" smtClean="0"/>
+              <a:t>needs and preferences when interacting with products, services and </a:t>
+            </a:r>
+            <a:r>
+              <a:rPr lang="en-CA" dirty="0" smtClean="0"/>
+              <a:t>environments</a:t>
             </a:r>
             <a:endParaRPr lang="en-CA" dirty="0"/>
           </a:p>
@@ -11015,15 +11143,49 @@
             <p:ph type="title"/>
           </p:nvPr>
         </p:nvSpPr>
-        <p:spPr/>
-        <p:txBody>
-          <a:bodyPr/>
-          <a:lstStyle/>
-          <a:p>
-            <a:r>
-              <a:rPr lang="en-CA" dirty="0" smtClean="0"/>
-              <a:t>Aim of Accessibility</a:t>
-            </a:r>
+        <p:spPr>
+          <a:xfrm>
+            <a:off x="457200" y="274638"/>
+            <a:ext cx="8229600" cy="1138138"/>
+          </a:xfrm>
+        </p:spPr>
+        <p:txBody>
+          <a:bodyPr/>
+          <a:lstStyle/>
+          <a:p>
+            <a:r>
+              <a:rPr lang="en-CA" dirty="0" smtClean="0"/>
+              <a:t/>
+            </a:r>
+            <a:br>
+              <a:rPr lang="en-CA" dirty="0" smtClean="0"/>
+            </a:br>
+            <a:r>
+              <a:rPr lang="en-CA" dirty="0" smtClean="0"/>
+              <a:t>Aim </a:t>
+            </a:r>
+            <a:r>
+              <a:rPr lang="en-CA" dirty="0" smtClean="0"/>
+              <a:t>of </a:t>
+            </a:r>
+            <a:r>
+              <a:rPr lang="en-CA" dirty="0" smtClean="0"/>
+              <a:t>Accessibility</a:t>
+            </a:r>
+            <a:br>
+              <a:rPr lang="en-CA" dirty="0" smtClean="0"/>
+            </a:br>
+            <a:r>
+              <a:rPr lang="en-CA" sz="3600" i="1" dirty="0"/>
+              <a:t>(#a11y)</a:t>
+            </a:r>
+            <a:r>
+              <a:rPr lang="en-CA" i="1" dirty="0"/>
+              <a:t/>
+            </a:r>
+            <a:br>
+              <a:rPr lang="en-CA" i="1" dirty="0"/>
+            </a:br>
             <a:endParaRPr lang="en-CA" dirty="0"/>
           </a:p>
         </p:txBody>
@@ -11038,23 +11200,39 @@
             <p:ph idx="1"/>
           </p:nvPr>
         </p:nvSpPr>
-        <p:spPr/>
-        <p:txBody>
-          <a:bodyPr/>
-          <a:lstStyle/>
-          <a:p>
-            <a:r>
-              <a:rPr lang="en-CA" dirty="0" smtClean="0"/>
-              <a:t>Provide services and information that give a person a sense of dignity, independence, integration and equal opportunity</a:t>
-            </a:r>
-          </a:p>
-          <a:p>
+        <p:spPr>
+          <a:xfrm>
+            <a:off x="457200" y="1628800"/>
+            <a:ext cx="8229600" cy="4497363"/>
+          </a:xfrm>
+        </p:spPr>
+        <p:txBody>
+          <a:bodyPr/>
+          <a:lstStyle/>
+          <a:p>
+            <a:r>
+              <a:rPr lang="en-CA" dirty="0" smtClean="0"/>
+              <a:t>Provide services and information that give a person a sense of dignity, independence, integration and equal </a:t>
+            </a:r>
+            <a:r>
+              <a:rPr lang="en-CA" dirty="0" smtClean="0"/>
+              <a:t>opportunity</a:t>
+            </a:r>
+          </a:p>
+          <a:p>
+            <a:pPr marL="0" indent="0">
+              <a:buNone/>
+            </a:pPr>
             <a:endParaRPr lang="en-CA" dirty="0" smtClean="0"/>
           </a:p>
           <a:p>
             <a:r>
               <a:rPr lang="en-CA" dirty="0" smtClean="0"/>
-              <a:t>The best thing about accessibility … simplicity, sound design, success through improved uptake, reduced errors, reduced enquiries, inclusion</a:t>
+              <a:t>The </a:t>
+            </a:r>
+            <a:r>
+              <a:rPr lang="en-CA" dirty="0" smtClean="0"/>
+              <a:t>best thing about accessibility … simplicity, sound design, success through improved uptake, reduced errors, reduced enquiries, inclusion</a:t>
             </a:r>
             <a:endParaRPr lang="en-CA" dirty="0"/>
           </a:p>

</xml_diff>

<commit_message>
Modified slide 2 (Overview) Added a new slide 23 (Scope of Considerations), with notes.
</commit_message>
<xml_diff>
--- a/Digital Product Innovation in the Public Service-TRAN.pptx
+++ b/Digital Product Innovation in the Public Service-TRAN.pptx
@@ -5,7 +5,7 @@
     <p:sldMasterId id="2147483648" r:id="rId4"/>
   </p:sldMasterIdLst>
   <p:notesMasterIdLst>
-    <p:notesMasterId r:id="rId30"/>
+    <p:notesMasterId r:id="rId31"/>
   </p:notesMasterIdLst>
   <p:sldIdLst>
     <p:sldId id="256" r:id="rId5"/>
@@ -30,9 +30,10 @@
     <p:sldId id="303" r:id="rId24"/>
     <p:sldId id="294" r:id="rId25"/>
     <p:sldId id="305" r:id="rId26"/>
-    <p:sldId id="291" r:id="rId27"/>
-    <p:sldId id="292" r:id="rId28"/>
-    <p:sldId id="304" r:id="rId29"/>
+    <p:sldId id="306" r:id="rId27"/>
+    <p:sldId id="291" r:id="rId28"/>
+    <p:sldId id="292" r:id="rId29"/>
+    <p:sldId id="304" r:id="rId30"/>
   </p:sldIdLst>
   <p:sldSz cx="9144000" cy="6858000" type="screen4x3"/>
   <p:notesSz cx="7010400" cy="9296400"/>
@@ -133,7 +134,7 @@
   </p:defaultTextStyle>
   <p:extLst>
     <p:ext uri="{EFAFB233-063F-42B5-8137-9DF3F51BA10A}">
-      <p15:sldGuideLst xmlns="" xmlns:p15="http://schemas.microsoft.com/office/powerpoint/2012/main">
+      <p15:sldGuideLst xmlns:p15="http://schemas.microsoft.com/office/powerpoint/2012/main" xmlns="">
         <p15:guide id="1" orient="horz" pos="2160">
           <p15:clr>
             <a:srgbClr val="A4A3A4"/>
@@ -232,7 +233,7 @@
           <a:p>
             <a:fld id="{4FE63C12-9747-4331-AD85-87339BD4C845}" type="datetimeFigureOut">
               <a:rPr lang="en-CA" smtClean="0"/>
-              <a:t>2017-11-15</a:t>
+              <a:t>2017-11-16</a:t>
             </a:fld>
             <a:endParaRPr lang="en-CA"/>
           </a:p>
@@ -545,12 +546,12 @@
           <a:lstStyle/>
           <a:p>
             <a:r>
-              <a:rPr lang="en-CA" dirty="0" err="1" smtClean="0"/>
-              <a:t>Originaly</a:t>
-            </a:r>
-            <a:r>
-              <a:rPr lang="en-CA" dirty="0" smtClean="0"/>
-              <a:t> version</a:t>
+              <a:rPr lang="en-CA" dirty="0" smtClean="0"/>
+              <a:t>Original </a:t>
+            </a:r>
+            <a:r>
+              <a:rPr lang="en-CA" dirty="0" smtClean="0"/>
+              <a:t>version</a:t>
             </a:r>
             <a:r>
               <a:rPr lang="en-CA" baseline="0" dirty="0" smtClean="0"/>
@@ -1485,15 +1486,7 @@
           <a:p>
             <a:r>
               <a:rPr lang="en-CA" dirty="0" smtClean="0"/>
-              <a:t>Build into the foundations of how you code the basics to enable tab navigation and </a:t>
-            </a:r>
-            <a:r>
-              <a:rPr lang="en-CA" dirty="0" smtClean="0"/>
-              <a:t>screen reader </a:t>
-            </a:r>
-            <a:r>
-              <a:rPr lang="en-CA" dirty="0" smtClean="0"/>
-              <a:t>interaction</a:t>
+              <a:t>Build into the foundations of how you code the basics to enable tab navigation and screen reader interaction</a:t>
             </a:r>
           </a:p>
           <a:p>
@@ -2243,7 +2236,238 @@
           <a:bodyPr/>
           <a:lstStyle/>
           <a:p>
-            <a:endParaRPr lang="en-CA" dirty="0"/>
+            <a:pPr marL="0" marR="0" indent="0" algn="l" defTabSz="914400" rtl="0" eaLnBrk="1" fontAlgn="auto" latinLnBrk="0" hangingPunct="1">
+              <a:lnSpc>
+                <a:spcPct val="100000"/>
+              </a:lnSpc>
+              <a:spcBef>
+                <a:spcPts val="0"/>
+              </a:spcBef>
+              <a:spcAft>
+                <a:spcPts val="0"/>
+              </a:spcAft>
+              <a:buClrTx/>
+              <a:buSzTx/>
+              <a:buFontTx/>
+              <a:buNone/>
+              <a:tabLst/>
+              <a:defRPr/>
+            </a:pPr>
+            <a:r>
+              <a:rPr lang="en-CA" dirty="0" smtClean="0"/>
+              <a:t>Whether procuring</a:t>
+            </a:r>
+            <a:r>
+              <a:rPr lang="en-CA" baseline="0" dirty="0" smtClean="0"/>
+              <a:t> development or COTS, requirements around accessibility should be stated</a:t>
+            </a:r>
+          </a:p>
+          <a:p>
+            <a:pPr marL="0" marR="0" indent="0" algn="l" defTabSz="914400" rtl="0" eaLnBrk="1" fontAlgn="auto" latinLnBrk="0" hangingPunct="1">
+              <a:lnSpc>
+                <a:spcPct val="100000"/>
+              </a:lnSpc>
+              <a:spcBef>
+                <a:spcPts val="0"/>
+              </a:spcBef>
+              <a:spcAft>
+                <a:spcPts val="0"/>
+              </a:spcAft>
+              <a:buClrTx/>
+              <a:buSzTx/>
+              <a:buFontTx/>
+              <a:buNone/>
+              <a:tabLst/>
+              <a:defRPr/>
+            </a:pPr>
+            <a:r>
+              <a:rPr lang="en-CA" dirty="0" smtClean="0"/>
+              <a:t>	Might be as short as simply requiring adherence to the published WCAG standards.</a:t>
+            </a:r>
+          </a:p>
+          <a:p>
+            <a:pPr marL="0" marR="0" indent="0" algn="l" defTabSz="914400" rtl="0" eaLnBrk="1" fontAlgn="auto" latinLnBrk="0" hangingPunct="1">
+              <a:lnSpc>
+                <a:spcPct val="100000"/>
+              </a:lnSpc>
+              <a:spcBef>
+                <a:spcPts val="0"/>
+              </a:spcBef>
+              <a:spcAft>
+                <a:spcPts val="0"/>
+              </a:spcAft>
+              <a:buClrTx/>
+              <a:buSzTx/>
+              <a:buFontTx/>
+              <a:buNone/>
+              <a:tabLst/>
+              <a:defRPr/>
+            </a:pPr>
+            <a:r>
+              <a:rPr lang="en-CA" dirty="0" smtClean="0"/>
+              <a:t>	We might allow for the contracted resource to provide a good and strong reason if some accessibility</a:t>
+            </a:r>
+            <a:r>
+              <a:rPr lang="en-CA" baseline="0" dirty="0" smtClean="0"/>
+              <a:t> feature can’t be met….</a:t>
+            </a:r>
+          </a:p>
+          <a:p>
+            <a:pPr marL="0" marR="0" indent="0" algn="l" defTabSz="914400" rtl="0" eaLnBrk="1" fontAlgn="auto" latinLnBrk="0" hangingPunct="1">
+              <a:lnSpc>
+                <a:spcPct val="100000"/>
+              </a:lnSpc>
+              <a:spcBef>
+                <a:spcPts val="0"/>
+              </a:spcBef>
+              <a:spcAft>
+                <a:spcPts val="0"/>
+              </a:spcAft>
+              <a:buClrTx/>
+              <a:buSzTx/>
+              <a:buFontTx/>
+              <a:buNone/>
+              <a:tabLst/>
+              <a:defRPr/>
+            </a:pPr>
+            <a:r>
+              <a:rPr lang="en-CA" baseline="0" dirty="0" smtClean="0"/>
+              <a:t>		Thinking of a map based application here.</a:t>
+            </a:r>
+          </a:p>
+          <a:p>
+            <a:pPr marL="0" marR="0" indent="0" algn="l" defTabSz="914400" rtl="0" eaLnBrk="1" fontAlgn="auto" latinLnBrk="0" hangingPunct="1">
+              <a:lnSpc>
+                <a:spcPct val="100000"/>
+              </a:lnSpc>
+              <a:spcBef>
+                <a:spcPts val="0"/>
+              </a:spcBef>
+              <a:spcAft>
+                <a:spcPts val="0"/>
+              </a:spcAft>
+              <a:buClrTx/>
+              <a:buSzTx/>
+              <a:buFontTx/>
+              <a:buNone/>
+              <a:tabLst/>
+              <a:defRPr/>
+            </a:pPr>
+            <a:endParaRPr lang="en-CA" baseline="0" dirty="0" smtClean="0"/>
+          </a:p>
+          <a:p>
+            <a:pPr marL="0" marR="0" indent="0" algn="l" defTabSz="914400" rtl="0" eaLnBrk="1" fontAlgn="auto" latinLnBrk="0" hangingPunct="1">
+              <a:lnSpc>
+                <a:spcPct val="100000"/>
+              </a:lnSpc>
+              <a:spcBef>
+                <a:spcPts val="0"/>
+              </a:spcBef>
+              <a:spcAft>
+                <a:spcPts val="0"/>
+              </a:spcAft>
+              <a:buClrTx/>
+              <a:buSzTx/>
+              <a:buFontTx/>
+              <a:buNone/>
+              <a:tabLst/>
+              <a:defRPr/>
+            </a:pPr>
+            <a:r>
+              <a:rPr lang="en-CA" dirty="0" smtClean="0"/>
+              <a:t>Our difficulty will be to test for contract</a:t>
+            </a:r>
+            <a:r>
+              <a:rPr lang="en-CA" baseline="0" dirty="0" smtClean="0"/>
+              <a:t> fulfillment.</a:t>
+            </a:r>
+          </a:p>
+          <a:p>
+            <a:pPr marL="0" marR="0" indent="0" algn="l" defTabSz="914400" rtl="0" eaLnBrk="1" fontAlgn="auto" latinLnBrk="0" hangingPunct="1">
+              <a:lnSpc>
+                <a:spcPct val="100000"/>
+              </a:lnSpc>
+              <a:spcBef>
+                <a:spcPts val="0"/>
+              </a:spcBef>
+              <a:spcAft>
+                <a:spcPts val="0"/>
+              </a:spcAft>
+              <a:buClrTx/>
+              <a:buSzTx/>
+              <a:buFontTx/>
+              <a:buNone/>
+              <a:tabLst/>
+              <a:defRPr/>
+            </a:pPr>
+            <a:r>
+              <a:rPr lang="en-CA" baseline="0" dirty="0" smtClean="0"/>
+              <a:t>	but if accessibility is made a part of the design process and testing occurs throughout the lifetime of the development,  then we can at least have some reasonable assurance.</a:t>
+            </a:r>
+          </a:p>
+          <a:p>
+            <a:pPr marL="0" marR="0" indent="0" algn="l" defTabSz="914400" rtl="0" eaLnBrk="1" fontAlgn="auto" latinLnBrk="0" hangingPunct="1">
+              <a:lnSpc>
+                <a:spcPct val="100000"/>
+              </a:lnSpc>
+              <a:spcBef>
+                <a:spcPts val="0"/>
+              </a:spcBef>
+              <a:spcAft>
+                <a:spcPts val="0"/>
+              </a:spcAft>
+              <a:buClrTx/>
+              <a:buSzTx/>
+              <a:buFontTx/>
+              <a:buNone/>
+              <a:tabLst/>
+              <a:defRPr/>
+            </a:pPr>
+            <a:endParaRPr lang="en-CA" dirty="0" smtClean="0"/>
+          </a:p>
+          <a:p>
+            <a:pPr marL="0" marR="0" indent="0" algn="l" defTabSz="914400" rtl="0" eaLnBrk="1" fontAlgn="auto" latinLnBrk="0" hangingPunct="1">
+              <a:lnSpc>
+                <a:spcPct val="100000"/>
+              </a:lnSpc>
+              <a:spcBef>
+                <a:spcPts val="0"/>
+              </a:spcBef>
+              <a:spcAft>
+                <a:spcPts val="0"/>
+              </a:spcAft>
+              <a:buClrTx/>
+              <a:buSzTx/>
+              <a:buFontTx/>
+              <a:buNone/>
+              <a:tabLst/>
+              <a:defRPr/>
+            </a:pPr>
+            <a:endParaRPr lang="en-CA" dirty="0" smtClean="0"/>
+          </a:p>
+          <a:p>
+            <a:pPr marL="0" marR="0" indent="0" algn="l" defTabSz="914400" rtl="0" eaLnBrk="1" fontAlgn="auto" latinLnBrk="0" hangingPunct="1">
+              <a:lnSpc>
+                <a:spcPct val="100000"/>
+              </a:lnSpc>
+              <a:spcBef>
+                <a:spcPts val="0"/>
+              </a:spcBef>
+              <a:spcAft>
+                <a:spcPts val="0"/>
+              </a:spcAft>
+              <a:buClrTx/>
+              <a:buSzTx/>
+              <a:buFontTx/>
+              <a:buNone/>
+              <a:tabLst/>
+              <a:defRPr/>
+            </a:pPr>
+            <a:r>
+              <a:rPr lang="en-CA" i="1" dirty="0" smtClean="0"/>
+              <a:t>Provide current sample contract/RFP language?</a:t>
+            </a:r>
+            <a:endParaRPr lang="en-CA" i="1" dirty="0"/>
           </a:p>
         </p:txBody>
       </p:sp>
@@ -2273,7 +2497,7 @@
     </p:spTree>
     <p:extLst>
       <p:ext uri="{BB962C8B-B14F-4D97-AF65-F5344CB8AC3E}">
-        <p14:creationId xmlns:p14="http://schemas.microsoft.com/office/powerpoint/2010/main" val="663608534"/>
+        <p14:creationId xmlns:p14="http://schemas.microsoft.com/office/powerpoint/2010/main" val="2054689265"/>
       </p:ext>
     </p:extLst>
   </p:cSld>
@@ -2357,7 +2581,7 @@
     </p:spTree>
     <p:extLst>
       <p:ext uri="{BB962C8B-B14F-4D97-AF65-F5344CB8AC3E}">
-        <p14:creationId xmlns:p14="http://schemas.microsoft.com/office/powerpoint/2010/main" val="228409931"/>
+        <p14:creationId xmlns:p14="http://schemas.microsoft.com/office/powerpoint/2010/main" val="663608534"/>
       </p:ext>
     </p:extLst>
   </p:cSld>
@@ -2433,6 +2657,90 @@
             <a:fld id="{25A75CAD-4A01-4A0D-B86C-6F4A2C678E6B}" type="slidenum">
               <a:rPr lang="en-CA" smtClean="0"/>
               <a:t>25</a:t>
+            </a:fld>
+            <a:endParaRPr lang="en-CA"/>
+          </a:p>
+        </p:txBody>
+      </p:sp>
+    </p:spTree>
+    <p:extLst>
+      <p:ext uri="{BB962C8B-B14F-4D97-AF65-F5344CB8AC3E}">
+        <p14:creationId xmlns:p14="http://schemas.microsoft.com/office/powerpoint/2010/main" val="228409931"/>
+      </p:ext>
+    </p:extLst>
+  </p:cSld>
+  <p:clrMapOvr>
+    <a:masterClrMapping/>
+  </p:clrMapOvr>
+</p:notes>
+</file>
+
+<file path=ppt/notesSlides/notesSlide26.xml><?xml version="1.0" encoding="utf-8"?>
+<p:notes xmlns:a="http://schemas.openxmlformats.org/drawingml/2006/main" xmlns:r="http://schemas.openxmlformats.org/officeDocument/2006/relationships" xmlns:p="http://schemas.openxmlformats.org/presentationml/2006/main">
+  <p:cSld>
+    <p:spTree>
+      <p:nvGrpSpPr>
+        <p:cNvPr id="1" name=""/>
+        <p:cNvGrpSpPr/>
+        <p:nvPr/>
+      </p:nvGrpSpPr>
+      <p:grpSpPr>
+        <a:xfrm>
+          <a:off x="0" y="0"/>
+          <a:ext cx="0" cy="0"/>
+          <a:chOff x="0" y="0"/>
+          <a:chExt cx="0" cy="0"/>
+        </a:xfrm>
+      </p:grpSpPr>
+      <p:sp>
+        <p:nvSpPr>
+          <p:cNvPr id="2" name="Slide Image Placeholder 1"/>
+          <p:cNvSpPr>
+            <a:spLocks noGrp="1" noRot="1" noChangeAspect="1"/>
+          </p:cNvSpPr>
+          <p:nvPr>
+            <p:ph type="sldImg"/>
+          </p:nvPr>
+        </p:nvSpPr>
+        <p:spPr/>
+      </p:sp>
+      <p:sp>
+        <p:nvSpPr>
+          <p:cNvPr id="3" name="Notes Placeholder 2"/>
+          <p:cNvSpPr>
+            <a:spLocks noGrp="1"/>
+          </p:cNvSpPr>
+          <p:nvPr>
+            <p:ph type="body" idx="1"/>
+          </p:nvPr>
+        </p:nvSpPr>
+        <p:spPr/>
+        <p:txBody>
+          <a:bodyPr/>
+          <a:lstStyle/>
+          <a:p>
+            <a:endParaRPr lang="en-CA" dirty="0"/>
+          </a:p>
+        </p:txBody>
+      </p:sp>
+      <p:sp>
+        <p:nvSpPr>
+          <p:cNvPr id="4" name="Slide Number Placeholder 3"/>
+          <p:cNvSpPr>
+            <a:spLocks noGrp="1"/>
+          </p:cNvSpPr>
+          <p:nvPr>
+            <p:ph type="sldNum" sz="quarter" idx="10"/>
+          </p:nvPr>
+        </p:nvSpPr>
+        <p:spPr/>
+        <p:txBody>
+          <a:bodyPr/>
+          <a:lstStyle/>
+          <a:p>
+            <a:fld id="{25A75CAD-4A01-4A0D-B86C-6F4A2C678E6B}" type="slidenum">
+              <a:rPr lang="en-CA" smtClean="0"/>
+              <a:t>26</a:t>
             </a:fld>
             <a:endParaRPr lang="en-CA"/>
           </a:p>
@@ -2854,29 +3162,8 @@
             </a:r>
             <a:r>
               <a:rPr lang="en-CA" baseline="0" dirty="0" smtClean="0"/>
-              <a:t> is a higher </a:t>
-            </a:r>
-            <a:r>
-              <a:rPr lang="en-CA" baseline="0" dirty="0" smtClean="0"/>
-              <a:t>prevalence </a:t>
-            </a:r>
-            <a:r>
-              <a:rPr lang="en-CA" baseline="0" dirty="0" smtClean="0"/>
-              <a:t>of users with learning/reading/cognitive barriers than there are blind. In fact colour blindness and </a:t>
-            </a:r>
-            <a:r>
-              <a:rPr lang="en-CA" baseline="0" dirty="0" smtClean="0"/>
-              <a:t>dyslexia </a:t>
-            </a:r>
-            <a:r>
-              <a:rPr lang="en-CA" baseline="0" dirty="0" smtClean="0"/>
-              <a:t>are more common than blindness as well BUT we know how to code for </a:t>
-            </a:r>
-            <a:r>
-              <a:rPr lang="en-CA" baseline="0" dirty="0" smtClean="0"/>
-              <a:t>screen readers.</a:t>
-            </a:r>
-            <a:endParaRPr lang="en-CA" baseline="0" dirty="0" smtClean="0"/>
+              <a:t> is a higher prevalence of users with learning/reading/cognitive barriers than there are blind. In fact colour blindness and dyslexia are more common than blindness as well BUT we know how to code for screen readers.</a:t>
+            </a:r>
           </a:p>
           <a:p>
             <a:endParaRPr lang="en-CA" baseline="0" dirty="0" smtClean="0"/>
@@ -2886,20 +3173,11 @@
               <a:rPr lang="en-CA" baseline="0" dirty="0" smtClean="0"/>
               <a:t>Why do we think of blind or deaf as the most common? </a:t>
             </a:r>
-            <a:endParaRPr lang="en-CA" baseline="0" dirty="0" smtClean="0"/>
           </a:p>
           <a:p>
             <a:r>
               <a:rPr lang="en-CA" baseline="0" dirty="0" smtClean="0"/>
-              <a:t>Advocates </a:t>
-            </a:r>
-            <a:r>
-              <a:rPr lang="en-CA" baseline="0" dirty="0" smtClean="0"/>
-              <a:t>… businesses, technology, it’s more “in your face</a:t>
-            </a:r>
-            <a:r>
-              <a:rPr lang="en-CA" baseline="0" dirty="0" smtClean="0"/>
-              <a:t>”  (HEIDI: Can we refine this – I’m not sure what this is meant to convey?)</a:t>
+              <a:t>Advocates … businesses, technology, it’s more “in your face”  (HEIDI: Can we refine this – I’m not sure what this is meant to convey?)</a:t>
             </a:r>
             <a:endParaRPr lang="en-CA" dirty="0" smtClean="0"/>
           </a:p>
@@ -3130,11 +3408,7 @@
             </a:r>
             <a:r>
               <a:rPr lang="en-CA" baseline="0" dirty="0" smtClean="0"/>
-              <a:t> in the previous slide through disabilities, we are catering for all users which could come from differing cultures, socioeconomic differences, location </a:t>
-            </a:r>
-            <a:r>
-              <a:rPr lang="en-CA" baseline="0" dirty="0" smtClean="0"/>
-              <a:t>…</a:t>
+              <a:t> in the previous slide through disabilities, we are catering for all users which could come from differing cultures, socioeconomic differences, location …</a:t>
             </a:r>
           </a:p>
           <a:p>
@@ -3142,12 +3416,11 @@
               <a:rPr lang="en-CA" baseline="0" dirty="0" smtClean="0"/>
               <a:t>(HEIDI – previous slide? )</a:t>
             </a:r>
+          </a:p>
+          <a:p>
             <a:endParaRPr lang="en-CA" baseline="0" dirty="0" smtClean="0"/>
           </a:p>
           <a:p>
-            <a:endParaRPr lang="en-CA" baseline="0" dirty="0" smtClean="0"/>
-          </a:p>
-          <a:p>
             <a:r>
               <a:rPr lang="en-CA" dirty="0" smtClean="0"/>
               <a:t>Other considerations of accessibility relate to:</a:t>
@@ -3168,15 +3441,7 @@
           <a:p>
             <a:r>
               <a:rPr lang="en-CA" dirty="0" smtClean="0"/>
-              <a:t>Persons in </a:t>
-            </a:r>
-            <a:r>
-              <a:rPr lang="en-CA" dirty="0" smtClean="0"/>
-              <a:t>differently </a:t>
-            </a:r>
-            <a:r>
-              <a:rPr lang="en-CA" dirty="0" smtClean="0"/>
-              <a:t>governed environments (First Nations)</a:t>
+              <a:t>Persons in differently governed environments (First Nations)</a:t>
             </a:r>
           </a:p>
           <a:p>
@@ -3986,7 +4251,7 @@
           <a:p>
             <a:fld id="{5DDB1DE6-DCFF-48D7-9CC0-C561253D4BC1}" type="datetimeFigureOut">
               <a:rPr lang="en-CA" smtClean="0"/>
-              <a:t>2017-11-15</a:t>
+              <a:t>2017-11-16</a:t>
             </a:fld>
             <a:endParaRPr lang="en-CA"/>
           </a:p>
@@ -4190,7 +4455,7 @@
           <a:p>
             <a:fld id="{5DDB1DE6-DCFF-48D7-9CC0-C561253D4BC1}" type="datetimeFigureOut">
               <a:rPr lang="en-CA" smtClean="0"/>
-              <a:t>2017-11-15</a:t>
+              <a:t>2017-11-16</a:t>
             </a:fld>
             <a:endParaRPr lang="en-CA"/>
           </a:p>
@@ -4388,7 +4653,7 @@
           <a:p>
             <a:fld id="{5DDB1DE6-DCFF-48D7-9CC0-C561253D4BC1}" type="datetimeFigureOut">
               <a:rPr lang="en-CA" smtClean="0"/>
-              <a:t>2017-11-15</a:t>
+              <a:t>2017-11-16</a:t>
             </a:fld>
             <a:endParaRPr lang="en-CA"/>
           </a:p>
@@ -4706,7 +4971,7 @@
           <a:p>
             <a:fld id="{5DDB1DE6-DCFF-48D7-9CC0-C561253D4BC1}" type="datetimeFigureOut">
               <a:rPr lang="en-CA" smtClean="0"/>
-              <a:t>2017-11-15</a:t>
+              <a:t>2017-11-16</a:t>
             </a:fld>
             <a:endParaRPr lang="en-CA"/>
           </a:p>
@@ -5018,7 +5283,7 @@
           <a:p>
             <a:fld id="{5DDB1DE6-DCFF-48D7-9CC0-C561253D4BC1}" type="datetimeFigureOut">
               <a:rPr lang="en-CA" smtClean="0"/>
-              <a:t>2017-11-15</a:t>
+              <a:t>2017-11-16</a:t>
             </a:fld>
             <a:endParaRPr lang="en-CA"/>
           </a:p>
@@ -5464,7 +5729,7 @@
           <a:p>
             <a:fld id="{5DDB1DE6-DCFF-48D7-9CC0-C561253D4BC1}" type="datetimeFigureOut">
               <a:rPr lang="en-CA" smtClean="0"/>
-              <a:t>2017-11-15</a:t>
+              <a:t>2017-11-16</a:t>
             </a:fld>
             <a:endParaRPr lang="en-CA"/>
           </a:p>
@@ -5606,7 +5871,7 @@
           <a:p>
             <a:fld id="{5DDB1DE6-DCFF-48D7-9CC0-C561253D4BC1}" type="datetimeFigureOut">
               <a:rPr lang="en-CA" smtClean="0"/>
-              <a:t>2017-11-15</a:t>
+              <a:t>2017-11-16</a:t>
             </a:fld>
             <a:endParaRPr lang="en-CA"/>
           </a:p>
@@ -5725,7 +5990,7 @@
           <a:p>
             <a:fld id="{5DDB1DE6-DCFF-48D7-9CC0-C561253D4BC1}" type="datetimeFigureOut">
               <a:rPr lang="en-CA" smtClean="0"/>
-              <a:t>2017-11-15</a:t>
+              <a:t>2017-11-16</a:t>
             </a:fld>
             <a:endParaRPr lang="en-CA"/>
           </a:p>
@@ -6026,7 +6291,7 @@
           <a:p>
             <a:fld id="{5DDB1DE6-DCFF-48D7-9CC0-C561253D4BC1}" type="datetimeFigureOut">
               <a:rPr lang="en-CA" smtClean="0"/>
-              <a:t>2017-11-15</a:t>
+              <a:t>2017-11-16</a:t>
             </a:fld>
             <a:endParaRPr lang="en-CA"/>
           </a:p>
@@ -6303,7 +6568,7 @@
           <a:p>
             <a:fld id="{5DDB1DE6-DCFF-48D7-9CC0-C561253D4BC1}" type="datetimeFigureOut">
               <a:rPr lang="en-CA" smtClean="0"/>
-              <a:t>2017-11-15</a:t>
+              <a:t>2017-11-16</a:t>
             </a:fld>
             <a:endParaRPr lang="en-CA"/>
           </a:p>
@@ -9221,7 +9486,9 @@
         </p:nvSpPr>
         <p:spPr/>
         <p:txBody>
-          <a:bodyPr/>
+          <a:bodyPr>
+            <a:normAutofit/>
+          </a:bodyPr>
           <a:lstStyle/>
           <a:p>
             <a:r>
@@ -9250,8 +9517,15 @@
           <a:p>
             <a:r>
               <a:rPr lang="en-CA" dirty="0" smtClean="0"/>
+              <a:t>Scope and scale of the issue for this Ministry</a:t>
+            </a:r>
+          </a:p>
+          <a:p>
+            <a:r>
+              <a:rPr lang="en-CA" dirty="0" smtClean="0"/>
               <a:t>Demonstrations</a:t>
             </a:r>
+            <a:endParaRPr lang="en-CA" dirty="0" smtClean="0"/>
           </a:p>
           <a:p>
             <a:r>
@@ -9585,6 +9859,114 @@
 </file>
 
 <file path=ppt/slides/slide23.xml><?xml version="1.0" encoding="utf-8"?>
+<p:sld xmlns:a="http://schemas.openxmlformats.org/drawingml/2006/main" xmlns:r="http://schemas.openxmlformats.org/officeDocument/2006/relationships" xmlns:p="http://schemas.openxmlformats.org/presentationml/2006/main">
+  <p:cSld>
+    <p:spTree>
+      <p:nvGrpSpPr>
+        <p:cNvPr id="1" name=""/>
+        <p:cNvGrpSpPr/>
+        <p:nvPr/>
+      </p:nvGrpSpPr>
+      <p:grpSpPr>
+        <a:xfrm>
+          <a:off x="0" y="0"/>
+          <a:ext cx="0" cy="0"/>
+          <a:chOff x="0" y="0"/>
+          <a:chExt cx="0" cy="0"/>
+        </a:xfrm>
+      </p:grpSpPr>
+      <p:sp>
+        <p:nvSpPr>
+          <p:cNvPr id="2" name="Title 1"/>
+          <p:cNvSpPr>
+            <a:spLocks noGrp="1"/>
+          </p:cNvSpPr>
+          <p:nvPr>
+            <p:ph type="title"/>
+          </p:nvPr>
+        </p:nvSpPr>
+        <p:spPr/>
+        <p:txBody>
+          <a:bodyPr/>
+          <a:lstStyle/>
+          <a:p>
+            <a:r>
+              <a:rPr lang="en-CA" dirty="0" smtClean="0"/>
+              <a:t>Scope of Considerations</a:t>
+            </a:r>
+            <a:endParaRPr lang="en-CA" dirty="0"/>
+          </a:p>
+        </p:txBody>
+      </p:sp>
+      <p:sp>
+        <p:nvSpPr>
+          <p:cNvPr id="3" name="Content Placeholder 2"/>
+          <p:cNvSpPr>
+            <a:spLocks noGrp="1"/>
+          </p:cNvSpPr>
+          <p:nvPr>
+            <p:ph idx="1"/>
+          </p:nvPr>
+        </p:nvSpPr>
+        <p:spPr/>
+        <p:txBody>
+          <a:bodyPr/>
+          <a:lstStyle/>
+          <a:p>
+            <a:r>
+              <a:rPr lang="en-CA" dirty="0" smtClean="0"/>
+              <a:t>Procurement</a:t>
+            </a:r>
+          </a:p>
+          <a:p>
+            <a:pPr lvl="1"/>
+            <a:r>
+              <a:rPr lang="en-CA" dirty="0" smtClean="0"/>
+              <a:t>EOI, RFP, Statements of Work, etc.</a:t>
+            </a:r>
+            <a:endParaRPr lang="en-CA" dirty="0" smtClean="0"/>
+          </a:p>
+          <a:p>
+            <a:r>
+              <a:rPr lang="en-CA" dirty="0" smtClean="0"/>
+              <a:t>Design and development</a:t>
+            </a:r>
+          </a:p>
+          <a:p>
+            <a:r>
+              <a:rPr lang="en-CA" dirty="0" smtClean="0"/>
+              <a:t>Testing</a:t>
+            </a:r>
+          </a:p>
+          <a:p>
+            <a:endParaRPr lang="en-CA" dirty="0" smtClean="0"/>
+          </a:p>
+          <a:p>
+            <a:endParaRPr lang="en-CA" dirty="0"/>
+          </a:p>
+        </p:txBody>
+      </p:sp>
+    </p:spTree>
+    <p:extLst>
+      <p:ext uri="{BB962C8B-B14F-4D97-AF65-F5344CB8AC3E}">
+        <p14:creationId xmlns:p14="http://schemas.microsoft.com/office/powerpoint/2010/main" val="2912854261"/>
+      </p:ext>
+    </p:extLst>
+  </p:cSld>
+  <p:clrMapOvr>
+    <a:masterClrMapping/>
+  </p:clrMapOvr>
+  <p:timing>
+    <p:tnLst>
+      <p:par>
+        <p:cTn id="1" dur="indefinite" restart="never" nodeType="tmRoot"/>
+      </p:par>
+    </p:tnLst>
+  </p:timing>
+</p:sld>
+</file>
+
+<file path=ppt/slides/slide24.xml><?xml version="1.0" encoding="utf-8"?>
 <p:sld xmlns:a="http://schemas.openxmlformats.org/drawingml/2006/main" xmlns:r="http://schemas.openxmlformats.org/officeDocument/2006/relationships" xmlns:p="http://schemas.openxmlformats.org/presentationml/2006/main">
   <p:cSld>
     <p:spTree>
@@ -9704,7 +10086,7 @@
 </p:sld>
 </file>
 
-<file path=ppt/slides/slide24.xml><?xml version="1.0" encoding="utf-8"?>
+<file path=ppt/slides/slide25.xml><?xml version="1.0" encoding="utf-8"?>
 <p:sld xmlns:a="http://schemas.openxmlformats.org/drawingml/2006/main" xmlns:r="http://schemas.openxmlformats.org/officeDocument/2006/relationships" xmlns:p="http://schemas.openxmlformats.org/presentationml/2006/main">
   <p:cSld>
     <p:spTree>
@@ -9786,7 +10168,7 @@
 </p:sld>
 </file>
 
-<file path=ppt/slides/slide25.xml><?xml version="1.0" encoding="utf-8"?>
+<file path=ppt/slides/slide26.xml><?xml version="1.0" encoding="utf-8"?>
 <p:sld xmlns:a="http://schemas.openxmlformats.org/drawingml/2006/main" xmlns:r="http://schemas.openxmlformats.org/officeDocument/2006/relationships" xmlns:p="http://schemas.openxmlformats.org/presentationml/2006/main">
   <p:cSld>
     <p:spTree>
@@ -10949,19 +11331,7 @@
             </a:pPr>
             <a:r>
               <a:rPr lang="en-CA" dirty="0" smtClean="0"/>
-              <a:t>… the flexibility to accommodate </a:t>
-            </a:r>
-            <a:r>
-              <a:rPr lang="en-CA" dirty="0" smtClean="0"/>
-              <a:t>every user’s </a:t>
-            </a:r>
-            <a:r>
-              <a:rPr lang="en-CA" dirty="0" smtClean="0"/>
-              <a:t>needs and preferences when interacting with products, services and </a:t>
-            </a:r>
-            <a:r>
-              <a:rPr lang="en-CA" dirty="0" smtClean="0"/>
-              <a:t>environments</a:t>
+              <a:t>… the flexibility to accommodate every user’s needs and preferences when interacting with products, services and environments</a:t>
             </a:r>
             <a:endParaRPr lang="en-CA" dirty="0"/>
           </a:p>
@@ -11162,15 +11532,7 @@
             </a:br>
             <a:r>
               <a:rPr lang="en-CA" dirty="0" smtClean="0"/>
-              <a:t>Aim </a:t>
-            </a:r>
-            <a:r>
-              <a:rPr lang="en-CA" dirty="0" smtClean="0"/>
-              <a:t>of </a:t>
-            </a:r>
-            <a:r>
-              <a:rPr lang="en-CA" dirty="0" smtClean="0"/>
-              <a:t>Accessibility</a:t>
+              <a:t>Aim of Accessibility</a:t>
             </a:r>
             <a:br>
               <a:rPr lang="en-CA" dirty="0" smtClean="0"/>
@@ -11212,11 +11574,7 @@
           <a:p>
             <a:r>
               <a:rPr lang="en-CA" dirty="0" smtClean="0"/>
-              <a:t>Provide services and information that give a person a sense of dignity, independence, integration and equal </a:t>
-            </a:r>
-            <a:r>
-              <a:rPr lang="en-CA" dirty="0" smtClean="0"/>
-              <a:t>opportunity</a:t>
+              <a:t>Provide services and information that give a person a sense of dignity, independence, integration and equal opportunity</a:t>
             </a:r>
           </a:p>
           <a:p>
@@ -11228,11 +11586,7 @@
           <a:p>
             <a:r>
               <a:rPr lang="en-CA" dirty="0" smtClean="0"/>
-              <a:t>The </a:t>
-            </a:r>
-            <a:r>
-              <a:rPr lang="en-CA" dirty="0" smtClean="0"/>
-              <a:t>best thing about accessibility … simplicity, sound design, success through improved uptake, reduced errors, reduced enquiries, inclusion</a:t>
+              <a:t>The best thing about accessibility … simplicity, sound design, success through improved uptake, reduced errors, reduced enquiries, inclusion</a:t>
             </a:r>
             <a:endParaRPr lang="en-CA" dirty="0"/>
           </a:p>
@@ -13032,21 +13386,6 @@
 </file>
 
 <file path=customXml/item1.xml><?xml version="1.0" encoding="utf-8"?>
-<p:properties xmlns:p="http://schemas.microsoft.com/office/2006/metadata/properties" xmlns:xsi="http://www.w3.org/2001/XMLSchema-instance" xmlns:pc="http://schemas.microsoft.com/office/infopath/2007/PartnerControls">
-  <documentManagement/>
-</p:properties>
-</file>
-
-<file path=customXml/item2.xml><?xml version="1.0" encoding="utf-8"?>
-<?mso-contentType ?>
-<FormTemplates xmlns="http://schemas.microsoft.com/sharepoint/v3/contenttype/forms">
-  <Display>DocumentLibraryForm</Display>
-  <Edit>DocumentLibraryForm</Edit>
-  <New>DocumentLibraryForm</New>
-</FormTemplates>
-</file>
-
-<file path=customXml/item3.xml><?xml version="1.0" encoding="utf-8"?>
 <ct:contentTypeSchema xmlns:ct="http://schemas.microsoft.com/office/2006/metadata/contentType" xmlns:ma="http://schemas.microsoft.com/office/2006/metadata/properties/metaAttributes" ct:_="" ma:_="" ma:contentTypeName="Document" ma:contentTypeID="0x01010010B8B88E69DC084DB4454BD303FC84A8" ma:contentTypeVersion="0" ma:contentTypeDescription="Create a new document." ma:contentTypeScope="" ma:versionID="1ecfcc0e9dc7a70c6e4f3ef885d95856">
   <xsd:schema xmlns:xsd="http://www.w3.org/2001/XMLSchema" xmlns:xs="http://www.w3.org/2001/XMLSchema" xmlns:p="http://schemas.microsoft.com/office/2006/metadata/properties" targetNamespace="http://schemas.microsoft.com/office/2006/metadata/properties" ma:root="true" ma:fieldsID="1648c5e0ecb366114e52100a5efdb160">
     <xsd:element name="properties">
@@ -13160,10 +13499,32 @@
 </ct:contentTypeSchema>
 </file>
 
+<file path=customXml/item2.xml><?xml version="1.0" encoding="utf-8"?>
+<?mso-contentType ?>
+<FormTemplates xmlns="http://schemas.microsoft.com/sharepoint/v3/contenttype/forms">
+  <Display>DocumentLibraryForm</Display>
+  <Edit>DocumentLibraryForm</Edit>
+  <New>DocumentLibraryForm</New>
+</FormTemplates>
+</file>
+
+<file path=customXml/item3.xml><?xml version="1.0" encoding="utf-8"?>
+<p:properties xmlns:p="http://schemas.microsoft.com/office/2006/metadata/properties" xmlns:xsi="http://www.w3.org/2001/XMLSchema-instance" xmlns:pc="http://schemas.microsoft.com/office/infopath/2007/PartnerControls">
+  <documentManagement/>
+</p:properties>
+</file>
+
 <file path=customXml/itemProps1.xml><?xml version="1.0" encoding="utf-8"?>
-<ds:datastoreItem xmlns:ds="http://schemas.openxmlformats.org/officeDocument/2006/customXml" ds:itemID="{5AAF29FC-63F9-4EC0-A194-DB5A0CAAC470}">
+<ds:datastoreItem xmlns:ds="http://schemas.openxmlformats.org/officeDocument/2006/customXml" ds:itemID="{C8F7BCDC-42FC-41AB-A454-1101C63034CE}">
   <ds:schemaRefs>
+    <ds:schemaRef ds:uri="http://schemas.microsoft.com/office/2006/metadata/contentType"/>
+    <ds:schemaRef ds:uri="http://schemas.microsoft.com/office/2006/metadata/properties/metaAttributes"/>
+    <ds:schemaRef ds:uri="http://www.w3.org/2001/XMLSchema"/>
     <ds:schemaRef ds:uri="http://schemas.microsoft.com/office/2006/metadata/properties"/>
+    <ds:schemaRef ds:uri="http://schemas.openxmlformats.org/package/2006/metadata/core-properties"/>
+    <ds:schemaRef ds:uri="http://purl.org/dc/elements/1.1/"/>
+    <ds:schemaRef ds:uri="http://purl.org/dc/terms/"/>
+    <ds:schemaRef ds:uri="http://schemas.microsoft.com/internal/obd"/>
     <ds:schemaRef ds:uri="http://schemas.microsoft.com/office/infopath/2007/PartnerControls"/>
   </ds:schemaRefs>
 </ds:datastoreItem>
@@ -13178,16 +13539,9 @@
 </file>
 
 <file path=customXml/itemProps3.xml><?xml version="1.0" encoding="utf-8"?>
-<ds:datastoreItem xmlns:ds="http://schemas.openxmlformats.org/officeDocument/2006/customXml" ds:itemID="{C8F7BCDC-42FC-41AB-A454-1101C63034CE}">
+<ds:datastoreItem xmlns:ds="http://schemas.openxmlformats.org/officeDocument/2006/customXml" ds:itemID="{5AAF29FC-63F9-4EC0-A194-DB5A0CAAC470}">
   <ds:schemaRefs>
-    <ds:schemaRef ds:uri="http://schemas.microsoft.com/office/2006/metadata/contentType"/>
-    <ds:schemaRef ds:uri="http://schemas.microsoft.com/office/2006/metadata/properties/metaAttributes"/>
-    <ds:schemaRef ds:uri="http://www.w3.org/2001/XMLSchema"/>
     <ds:schemaRef ds:uri="http://schemas.microsoft.com/office/2006/metadata/properties"/>
-    <ds:schemaRef ds:uri="http://schemas.openxmlformats.org/package/2006/metadata/core-properties"/>
-    <ds:schemaRef ds:uri="http://purl.org/dc/elements/1.1/"/>
-    <ds:schemaRef ds:uri="http://purl.org/dc/terms/"/>
-    <ds:schemaRef ds:uri="http://schemas.microsoft.com/internal/obd"/>
     <ds:schemaRef ds:uri="http://schemas.microsoft.com/office/infopath/2007/PartnerControls"/>
   </ds:schemaRefs>
 </ds:datastoreItem>

</xml_diff>

<commit_message>
TOOLS doc is a file for notes that talks about Accessibilioty testing tools.  The PPTX now has a bunch of material added for a TRAN presentation.
</commit_message>
<xml_diff>
--- a/Digital Product Innovation in the Public Service-TRAN.pptx
+++ b/Digital Product Innovation in the Public Service-TRAN.pptx
@@ -5,7 +5,7 @@
     <p:sldMasterId id="2147483648" r:id="rId4"/>
   </p:sldMasterIdLst>
   <p:notesMasterIdLst>
-    <p:notesMasterId r:id="rId31"/>
+    <p:notesMasterId r:id="rId34"/>
   </p:notesMasterIdLst>
   <p:sldIdLst>
     <p:sldId id="256" r:id="rId5"/>
@@ -33,7 +33,10 @@
     <p:sldId id="306" r:id="rId27"/>
     <p:sldId id="291" r:id="rId28"/>
     <p:sldId id="292" r:id="rId29"/>
-    <p:sldId id="304" r:id="rId30"/>
+    <p:sldId id="307" r:id="rId30"/>
+    <p:sldId id="308" r:id="rId31"/>
+    <p:sldId id="309" r:id="rId32"/>
+    <p:sldId id="304" r:id="rId33"/>
   </p:sldIdLst>
   <p:sldSz cx="9144000" cy="6858000" type="screen4x3"/>
   <p:notesSz cx="7010400" cy="9296400"/>
@@ -134,7 +137,7 @@
   </p:defaultTextStyle>
   <p:extLst>
     <p:ext uri="{EFAFB233-063F-42B5-8137-9DF3F51BA10A}">
-      <p15:sldGuideLst xmlns:p15="http://schemas.microsoft.com/office/powerpoint/2012/main" xmlns="">
+      <p15:sldGuideLst xmlns="" xmlns:p15="http://schemas.microsoft.com/office/powerpoint/2012/main">
         <p15:guide id="1" orient="horz" pos="2160">
           <p15:clr>
             <a:srgbClr val="A4A3A4"/>
@@ -233,7 +236,7 @@
           <a:p>
             <a:fld id="{4FE63C12-9747-4331-AD85-87339BD4C845}" type="datetimeFigureOut">
               <a:rPr lang="en-CA" smtClean="0"/>
-              <a:t>2017-11-16</a:t>
+              <a:t>2017-11-29</a:t>
             </a:fld>
             <a:endParaRPr lang="en-CA"/>
           </a:p>
@@ -547,11 +550,7 @@
           <a:p>
             <a:r>
               <a:rPr lang="en-CA" dirty="0" smtClean="0"/>
-              <a:t>Original </a:t>
-            </a:r>
-            <a:r>
-              <a:rPr lang="en-CA" dirty="0" smtClean="0"/>
-              <a:t>version</a:t>
+              <a:t>Original version</a:t>
             </a:r>
             <a:r>
               <a:rPr lang="en-CA" baseline="0" dirty="0" smtClean="0"/>
@@ -645,7 +644,7 @@
           <a:bodyPr/>
           <a:lstStyle/>
           <a:p>
-            <a:endParaRPr lang="en-CA"/>
+            <a:endParaRPr lang="en-CA" dirty="0"/>
           </a:p>
         </p:txBody>
       </p:sp>
@@ -1015,6 +1014,85 @@
           <a:bodyPr/>
           <a:lstStyle/>
           <a:p>
+            <a:pPr marL="0" marR="0" indent="0" algn="l" defTabSz="914400" rtl="0" eaLnBrk="1" fontAlgn="auto" latinLnBrk="0" hangingPunct="1">
+              <a:lnSpc>
+                <a:spcPct val="100000"/>
+              </a:lnSpc>
+              <a:spcBef>
+                <a:spcPts val="0"/>
+              </a:spcBef>
+              <a:spcAft>
+                <a:spcPts val="0"/>
+              </a:spcAft>
+              <a:buClrTx/>
+              <a:buSzTx/>
+              <a:buFontTx/>
+              <a:buNone/>
+              <a:tabLst/>
+              <a:defRPr/>
+            </a:pPr>
+            <a:r>
+              <a:rPr lang="en-CA" sz="1200" kern="1200" dirty="0" smtClean="0">
+                <a:solidFill>
+                  <a:schemeClr val="tx1"/>
+                </a:solidFill>
+                <a:effectLst/>
+                <a:latin typeface="+mn-lt"/>
+                <a:ea typeface="+mn-ea"/>
+                <a:cs typeface="+mn-cs"/>
+              </a:rPr>
+              <a:t>Challenge to federal websites filed by Donna </a:t>
+            </a:r>
+            <a:r>
+              <a:rPr lang="en-CA" sz="1200" kern="1200" dirty="0" err="1" smtClean="0">
+                <a:solidFill>
+                  <a:schemeClr val="tx1"/>
+                </a:solidFill>
+                <a:effectLst/>
+                <a:latin typeface="+mn-lt"/>
+                <a:ea typeface="+mn-ea"/>
+                <a:cs typeface="+mn-cs"/>
+              </a:rPr>
+              <a:t>Jodhan</a:t>
+            </a:r>
+            <a:r>
+              <a:rPr lang="en-CA" sz="1200" kern="1200" dirty="0" smtClean="0">
+                <a:solidFill>
+                  <a:schemeClr val="tx1"/>
+                </a:solidFill>
+                <a:effectLst/>
+                <a:latin typeface="+mn-lt"/>
+                <a:ea typeface="+mn-ea"/>
+                <a:cs typeface="+mn-cs"/>
+              </a:rPr>
+              <a:t> of Toronto. She is legally blind and is a sophisticated computer user. Despite being computer savvy, </a:t>
+            </a:r>
+            <a:r>
+              <a:rPr lang="en-CA" sz="1200" kern="1200" dirty="0" err="1" smtClean="0">
+                <a:solidFill>
+                  <a:schemeClr val="tx1"/>
+                </a:solidFill>
+                <a:effectLst/>
+                <a:latin typeface="+mn-lt"/>
+                <a:ea typeface="+mn-ea"/>
+                <a:cs typeface="+mn-cs"/>
+              </a:rPr>
+              <a:t>Jodhan</a:t>
+            </a:r>
+            <a:r>
+              <a:rPr lang="en-CA" sz="1200" kern="1200" dirty="0" smtClean="0">
+                <a:solidFill>
+                  <a:schemeClr val="tx1"/>
+                </a:solidFill>
+                <a:effectLst/>
+                <a:latin typeface="+mn-lt"/>
+                <a:ea typeface="+mn-ea"/>
+                <a:cs typeface="+mn-cs"/>
+              </a:rPr>
+              <a:t> was unable to access the federal government's informational and transactional services online. She sued and cited five examples of inaccessible online services, and in November 2010 the Federal Court agreed with her.</a:t>
+            </a:r>
+          </a:p>
+          <a:p>
             <a:endParaRPr lang="en-CA" dirty="0"/>
           </a:p>
         </p:txBody>
@@ -1742,7 +1820,7 @@
           <a:bodyPr/>
           <a:lstStyle/>
           <a:p>
-            <a:endParaRPr lang="en-CA"/>
+            <a:endParaRPr lang="en-CA" dirty="0"/>
           </a:p>
         </p:txBody>
       </p:sp>
@@ -1826,6 +1904,14 @@
           <a:bodyPr/>
           <a:lstStyle/>
           <a:p>
+            <a:r>
+              <a:rPr lang="en-CA" dirty="0" smtClean="0"/>
+              <a:t>Political correctness traps.</a:t>
+            </a:r>
+            <a:r>
+              <a:rPr lang="en-CA" baseline="0" dirty="0" smtClean="0"/>
+              <a:t>  No offense intended.</a:t>
+            </a:r>
             <a:endParaRPr lang="en-CA" dirty="0"/>
           </a:p>
         </p:txBody>
@@ -2443,6 +2529,18 @@
               <a:tabLst/>
               <a:defRPr/>
             </a:pPr>
+            <a:r>
+              <a:rPr lang="en-CA" dirty="0" smtClean="0"/>
+              <a:t>Agile and it’s scrum/sprint model of delivery lends itself well here.  Waterfall approaches will need to ensure that accessibility is NOT an afterthought but built in throughout  each </a:t>
+            </a:r>
+            <a:r>
+              <a:rPr lang="en-CA" dirty="0" err="1" smtClean="0"/>
+              <a:t>subprocess</a:t>
+            </a:r>
+            <a:r>
+              <a:rPr lang="en-CA" dirty="0" smtClean="0"/>
+              <a:t>.</a:t>
+            </a:r>
             <a:endParaRPr lang="en-CA" dirty="0" smtClean="0"/>
           </a:p>
           <a:p>
@@ -2463,9 +2561,33 @@
               <a:tabLst/>
               <a:defRPr/>
             </a:pPr>
+            <a:endParaRPr lang="en-CA" i="1" dirty="0" smtClean="0"/>
+          </a:p>
+          <a:p>
+            <a:pPr marL="0" marR="0" indent="0" algn="l" defTabSz="914400" rtl="0" eaLnBrk="1" fontAlgn="auto" latinLnBrk="0" hangingPunct="1">
+              <a:lnSpc>
+                <a:spcPct val="100000"/>
+              </a:lnSpc>
+              <a:spcBef>
+                <a:spcPts val="0"/>
+              </a:spcBef>
+              <a:spcAft>
+                <a:spcPts val="0"/>
+              </a:spcAft>
+              <a:buClrTx/>
+              <a:buSzTx/>
+              <a:buFontTx/>
+              <a:buNone/>
+              <a:tabLst/>
+              <a:defRPr/>
+            </a:pPr>
             <a:r>
               <a:rPr lang="en-CA" i="1" dirty="0" smtClean="0"/>
-              <a:t>Provide current sample contract/RFP language?</a:t>
+              <a:t>Provide </a:t>
+            </a:r>
+            <a:r>
+              <a:rPr lang="en-CA" i="1" dirty="0" smtClean="0"/>
+              <a:t>current sample contract/RFP language?</a:t>
             </a:r>
             <a:endParaRPr lang="en-CA" i="1" dirty="0"/>
           </a:p>
@@ -2749,6 +2871,368 @@
     </p:spTree>
     <p:extLst>
       <p:ext uri="{BB962C8B-B14F-4D97-AF65-F5344CB8AC3E}">
+        <p14:creationId xmlns:p14="http://schemas.microsoft.com/office/powerpoint/2010/main" val="228409931"/>
+      </p:ext>
+    </p:extLst>
+  </p:cSld>
+  <p:clrMapOvr>
+    <a:masterClrMapping/>
+  </p:clrMapOvr>
+</p:notes>
+</file>
+
+<file path=ppt/notesSlides/notesSlide27.xml><?xml version="1.0" encoding="utf-8"?>
+<p:notes xmlns:a="http://schemas.openxmlformats.org/drawingml/2006/main" xmlns:r="http://schemas.openxmlformats.org/officeDocument/2006/relationships" xmlns:p="http://schemas.openxmlformats.org/presentationml/2006/main">
+  <p:cSld>
+    <p:spTree>
+      <p:nvGrpSpPr>
+        <p:cNvPr id="1" name=""/>
+        <p:cNvGrpSpPr/>
+        <p:nvPr/>
+      </p:nvGrpSpPr>
+      <p:grpSpPr>
+        <a:xfrm>
+          <a:off x="0" y="0"/>
+          <a:ext cx="0" cy="0"/>
+          <a:chOff x="0" y="0"/>
+          <a:chExt cx="0" cy="0"/>
+        </a:xfrm>
+      </p:grpSpPr>
+      <p:sp>
+        <p:nvSpPr>
+          <p:cNvPr id="2" name="Slide Image Placeholder 1"/>
+          <p:cNvSpPr>
+            <a:spLocks noGrp="1" noRot="1" noChangeAspect="1"/>
+          </p:cNvSpPr>
+          <p:nvPr>
+            <p:ph type="sldImg"/>
+          </p:nvPr>
+        </p:nvSpPr>
+        <p:spPr/>
+      </p:sp>
+      <p:sp>
+        <p:nvSpPr>
+          <p:cNvPr id="3" name="Notes Placeholder 2"/>
+          <p:cNvSpPr>
+            <a:spLocks noGrp="1"/>
+          </p:cNvSpPr>
+          <p:nvPr>
+            <p:ph type="body" idx="1"/>
+          </p:nvPr>
+        </p:nvSpPr>
+        <p:spPr/>
+        <p:txBody>
+          <a:bodyPr/>
+          <a:lstStyle/>
+          <a:p>
+            <a:r>
+              <a:rPr lang="en-CA" dirty="0" smtClean="0"/>
+              <a:t>Switch to browser WAVE demo</a:t>
+            </a:r>
+            <a:endParaRPr lang="en-CA" dirty="0"/>
+          </a:p>
+        </p:txBody>
+      </p:sp>
+      <p:sp>
+        <p:nvSpPr>
+          <p:cNvPr id="4" name="Slide Number Placeholder 3"/>
+          <p:cNvSpPr>
+            <a:spLocks noGrp="1"/>
+          </p:cNvSpPr>
+          <p:nvPr>
+            <p:ph type="sldNum" sz="quarter" idx="10"/>
+          </p:nvPr>
+        </p:nvSpPr>
+        <p:spPr/>
+        <p:txBody>
+          <a:bodyPr/>
+          <a:lstStyle/>
+          <a:p>
+            <a:fld id="{25A75CAD-4A01-4A0D-B86C-6F4A2C678E6B}" type="slidenum">
+              <a:rPr lang="en-CA" smtClean="0"/>
+              <a:t>27</a:t>
+            </a:fld>
+            <a:endParaRPr lang="en-CA"/>
+          </a:p>
+        </p:txBody>
+      </p:sp>
+    </p:spTree>
+    <p:extLst>
+      <p:ext uri="{BB962C8B-B14F-4D97-AF65-F5344CB8AC3E}">
+        <p14:creationId xmlns:p14="http://schemas.microsoft.com/office/powerpoint/2010/main" val="228409931"/>
+      </p:ext>
+    </p:extLst>
+  </p:cSld>
+  <p:clrMapOvr>
+    <a:masterClrMapping/>
+  </p:clrMapOvr>
+</p:notes>
+</file>
+
+<file path=ppt/notesSlides/notesSlide28.xml><?xml version="1.0" encoding="utf-8"?>
+<p:notes xmlns:a="http://schemas.openxmlformats.org/drawingml/2006/main" xmlns:r="http://schemas.openxmlformats.org/officeDocument/2006/relationships" xmlns:p="http://schemas.openxmlformats.org/presentationml/2006/main">
+  <p:cSld>
+    <p:spTree>
+      <p:nvGrpSpPr>
+        <p:cNvPr id="1" name=""/>
+        <p:cNvGrpSpPr/>
+        <p:nvPr/>
+      </p:nvGrpSpPr>
+      <p:grpSpPr>
+        <a:xfrm>
+          <a:off x="0" y="0"/>
+          <a:ext cx="0" cy="0"/>
+          <a:chOff x="0" y="0"/>
+          <a:chExt cx="0" cy="0"/>
+        </a:xfrm>
+      </p:grpSpPr>
+      <p:sp>
+        <p:nvSpPr>
+          <p:cNvPr id="2" name="Slide Image Placeholder 1"/>
+          <p:cNvSpPr>
+            <a:spLocks noGrp="1" noRot="1" noChangeAspect="1"/>
+          </p:cNvSpPr>
+          <p:nvPr>
+            <p:ph type="sldImg"/>
+          </p:nvPr>
+        </p:nvSpPr>
+        <p:spPr/>
+      </p:sp>
+      <p:sp>
+        <p:nvSpPr>
+          <p:cNvPr id="3" name="Notes Placeholder 2"/>
+          <p:cNvSpPr>
+            <a:spLocks noGrp="1"/>
+          </p:cNvSpPr>
+          <p:nvPr>
+            <p:ph type="body" idx="1"/>
+          </p:nvPr>
+        </p:nvSpPr>
+        <p:spPr/>
+        <p:txBody>
+          <a:bodyPr/>
+          <a:lstStyle/>
+          <a:p>
+            <a:pPr lvl="1"/>
+            <a:r>
+              <a:rPr lang="en-CA" dirty="0" smtClean="0"/>
+              <a:t>JAWS (voice rendering)</a:t>
+            </a:r>
+          </a:p>
+          <a:p>
+            <a:pPr lvl="2"/>
+            <a:r>
+              <a:rPr lang="en-CA" dirty="0" smtClean="0"/>
+              <a:t>Costs, but a free version has recently come available</a:t>
+            </a:r>
+          </a:p>
+          <a:p>
+            <a:pPr lvl="2"/>
+            <a:r>
+              <a:rPr lang="en-CA" dirty="0" smtClean="0"/>
+              <a:t>Feature rich</a:t>
+            </a:r>
+          </a:p>
+          <a:p>
+            <a:pPr lvl="2"/>
+            <a:r>
+              <a:rPr lang="en-CA" dirty="0" smtClean="0"/>
+              <a:t>Easier to use</a:t>
+            </a:r>
+          </a:p>
+          <a:p>
+            <a:pPr lvl="2"/>
+            <a:r>
+              <a:rPr lang="en-CA" dirty="0" smtClean="0"/>
+              <a:t>Multiple “synths” (voices) available for a price.</a:t>
+            </a:r>
+          </a:p>
+          <a:p>
+            <a:pPr lvl="2"/>
+            <a:endParaRPr lang="en-CA" dirty="0" smtClean="0"/>
+          </a:p>
+          <a:p>
+            <a:pPr lvl="1"/>
+            <a:r>
+              <a:rPr lang="en-CA" dirty="0" smtClean="0"/>
+              <a:t>NVDA </a:t>
+            </a:r>
+            <a:r>
+              <a:rPr lang="en-CA" dirty="0" err="1" smtClean="0"/>
+              <a:t>NonVisual</a:t>
+            </a:r>
+            <a:r>
+              <a:rPr lang="en-CA" smtClean="0"/>
+              <a:t> Desktop </a:t>
+            </a:r>
+            <a:r>
+              <a:rPr lang="en-CA" dirty="0" smtClean="0"/>
+              <a:t>Access (voice rendering)</a:t>
+            </a:r>
+          </a:p>
+          <a:p>
+            <a:pPr lvl="2"/>
+            <a:r>
+              <a:rPr lang="en-CA" dirty="0" smtClean="0"/>
+              <a:t>Since 2007 has been increasing dramatically in popularity</a:t>
+            </a:r>
+          </a:p>
+          <a:p>
+            <a:pPr lvl="2"/>
+            <a:r>
+              <a:rPr lang="en-CA" dirty="0" smtClean="0"/>
+              <a:t>Lags in technical features</a:t>
+            </a:r>
+          </a:p>
+          <a:p>
+            <a:pPr lvl="2"/>
+            <a:r>
+              <a:rPr lang="en-CA" dirty="0" smtClean="0"/>
+              <a:t>Runs off many devices including thumb drives.</a:t>
+            </a:r>
+          </a:p>
+          <a:p>
+            <a:pPr lvl="2"/>
+            <a:r>
+              <a:rPr lang="en-CA" dirty="0" smtClean="0"/>
+              <a:t>Primarily uses Microsoft’s built-in “synths”  but hacks (most illegal) may be possible</a:t>
+            </a:r>
+          </a:p>
+          <a:p>
+            <a:pPr lvl="2"/>
+            <a:endParaRPr lang="en-CA" dirty="0" smtClean="0"/>
+          </a:p>
+          <a:p>
+            <a:pPr lvl="1"/>
+            <a:r>
+              <a:rPr lang="en-CA" dirty="0" smtClean="0"/>
+              <a:t>Smart </a:t>
+            </a:r>
+            <a:r>
+              <a:rPr lang="en-CA" baseline="0" dirty="0" smtClean="0"/>
+              <a:t>Phones!</a:t>
+            </a:r>
+          </a:p>
+          <a:p>
+            <a:pPr lvl="2"/>
+            <a:r>
+              <a:rPr lang="en-CA" baseline="0" dirty="0" smtClean="0"/>
+              <a:t>Tricky but good in a pinch.  These are in fact used for real, but the expense of the phone makes them a less used tool for those on limited budgets.</a:t>
+            </a:r>
+            <a:endParaRPr lang="en-CA" dirty="0" smtClean="0"/>
+          </a:p>
+        </p:txBody>
+      </p:sp>
+      <p:sp>
+        <p:nvSpPr>
+          <p:cNvPr id="4" name="Slide Number Placeholder 3"/>
+          <p:cNvSpPr>
+            <a:spLocks noGrp="1"/>
+          </p:cNvSpPr>
+          <p:nvPr>
+            <p:ph type="sldNum" sz="quarter" idx="10"/>
+          </p:nvPr>
+        </p:nvSpPr>
+        <p:spPr/>
+        <p:txBody>
+          <a:bodyPr/>
+          <a:lstStyle/>
+          <a:p>
+            <a:fld id="{25A75CAD-4A01-4A0D-B86C-6F4A2C678E6B}" type="slidenum">
+              <a:rPr lang="en-CA" smtClean="0"/>
+              <a:t>28</a:t>
+            </a:fld>
+            <a:endParaRPr lang="en-CA"/>
+          </a:p>
+        </p:txBody>
+      </p:sp>
+    </p:spTree>
+    <p:extLst>
+      <p:ext uri="{BB962C8B-B14F-4D97-AF65-F5344CB8AC3E}">
+        <p14:creationId xmlns:p14="http://schemas.microsoft.com/office/powerpoint/2010/main" val="228409931"/>
+      </p:ext>
+    </p:extLst>
+  </p:cSld>
+  <p:clrMapOvr>
+    <a:masterClrMapping/>
+  </p:clrMapOvr>
+</p:notes>
+</file>
+
+<file path=ppt/notesSlides/notesSlide29.xml><?xml version="1.0" encoding="utf-8"?>
+<p:notes xmlns:a="http://schemas.openxmlformats.org/drawingml/2006/main" xmlns:r="http://schemas.openxmlformats.org/officeDocument/2006/relationships" xmlns:p="http://schemas.openxmlformats.org/presentationml/2006/main">
+  <p:cSld>
+    <p:spTree>
+      <p:nvGrpSpPr>
+        <p:cNvPr id="1" name=""/>
+        <p:cNvGrpSpPr/>
+        <p:nvPr/>
+      </p:nvGrpSpPr>
+      <p:grpSpPr>
+        <a:xfrm>
+          <a:off x="0" y="0"/>
+          <a:ext cx="0" cy="0"/>
+          <a:chOff x="0" y="0"/>
+          <a:chExt cx="0" cy="0"/>
+        </a:xfrm>
+      </p:grpSpPr>
+      <p:sp>
+        <p:nvSpPr>
+          <p:cNvPr id="2" name="Slide Image Placeholder 1"/>
+          <p:cNvSpPr>
+            <a:spLocks noGrp="1" noRot="1" noChangeAspect="1"/>
+          </p:cNvSpPr>
+          <p:nvPr>
+            <p:ph type="sldImg"/>
+          </p:nvPr>
+        </p:nvSpPr>
+        <p:spPr/>
+      </p:sp>
+      <p:sp>
+        <p:nvSpPr>
+          <p:cNvPr id="3" name="Notes Placeholder 2"/>
+          <p:cNvSpPr>
+            <a:spLocks noGrp="1"/>
+          </p:cNvSpPr>
+          <p:nvPr>
+            <p:ph type="body" idx="1"/>
+          </p:nvPr>
+        </p:nvSpPr>
+        <p:spPr/>
+        <p:txBody>
+          <a:bodyPr/>
+          <a:lstStyle/>
+          <a:p>
+            <a:endParaRPr lang="en-CA" dirty="0"/>
+          </a:p>
+        </p:txBody>
+      </p:sp>
+      <p:sp>
+        <p:nvSpPr>
+          <p:cNvPr id="4" name="Slide Number Placeholder 3"/>
+          <p:cNvSpPr>
+            <a:spLocks noGrp="1"/>
+          </p:cNvSpPr>
+          <p:nvPr>
+            <p:ph type="sldNum" sz="quarter" idx="10"/>
+          </p:nvPr>
+        </p:nvSpPr>
+        <p:spPr/>
+        <p:txBody>
+          <a:bodyPr/>
+          <a:lstStyle/>
+          <a:p>
+            <a:fld id="{25A75CAD-4A01-4A0D-B86C-6F4A2C678E6B}" type="slidenum">
+              <a:rPr lang="en-CA" smtClean="0"/>
+              <a:t>29</a:t>
+            </a:fld>
+            <a:endParaRPr lang="en-CA"/>
+          </a:p>
+        </p:txBody>
+      </p:sp>
+    </p:spTree>
+    <p:extLst>
+      <p:ext uri="{BB962C8B-B14F-4D97-AF65-F5344CB8AC3E}">
         <p14:creationId xmlns:p14="http://schemas.microsoft.com/office/powerpoint/2010/main" val="322627780"/>
       </p:ext>
     </p:extLst>
@@ -3414,7 +3898,7 @@
           <a:p>
             <a:r>
               <a:rPr lang="en-CA" baseline="0" dirty="0" smtClean="0"/>
-              <a:t>(HEIDI – previous slide? )</a:t>
+              <a:t>(HEIDI – which previous slide? )</a:t>
             </a:r>
           </a:p>
           <a:p>
@@ -3568,7 +4052,15 @@
           <a:bodyPr/>
           <a:lstStyle/>
           <a:p>
-            <a:endParaRPr lang="en-CA"/>
+            <a:r>
+              <a:rPr lang="en-CA" dirty="0" smtClean="0"/>
+              <a:t>“</a:t>
+            </a:r>
+            <a:r>
+              <a:rPr lang="en-CA" dirty="0" smtClean="0"/>
+              <a:t>There is a deeply sad irony in the idea that people who are all about inclusion use a cryptic Twitter hashtag that excludes all but the elite who have been clued into what it’s supposed to mean.”</a:t>
+            </a:r>
+            <a:endParaRPr lang="en-CA" dirty="0"/>
           </a:p>
         </p:txBody>
       </p:sp>
@@ -3696,12 +4188,12 @@
               <a:t> so they have difficulty navigating around the site because the important information </a:t>
             </a:r>
             <a:r>
-              <a:rPr lang="en-CA" baseline="0" dirty="0" err="1" smtClean="0"/>
-              <a:t>isnt</a:t>
-            </a:r>
-            <a:r>
               <a:rPr lang="en-CA" baseline="0" dirty="0" smtClean="0"/>
-              <a:t> located together, the site page loops or skips content when they try to use the keyboard to tab through the page to the search box</a:t>
+              <a:t>isn’t </a:t>
+            </a:r>
+            <a:r>
+              <a:rPr lang="en-CA" baseline="0" dirty="0" smtClean="0"/>
+              <a:t>located together, the site page loops or skips content when they try to use the keyboard to tab through the page to the search box</a:t>
             </a:r>
           </a:p>
           <a:p>
@@ -4251,7 +4743,7 @@
           <a:p>
             <a:fld id="{5DDB1DE6-DCFF-48D7-9CC0-C561253D4BC1}" type="datetimeFigureOut">
               <a:rPr lang="en-CA" smtClean="0"/>
-              <a:t>2017-11-16</a:t>
+              <a:t>2017-11-29</a:t>
             </a:fld>
             <a:endParaRPr lang="en-CA"/>
           </a:p>
@@ -4455,7 +4947,7 @@
           <a:p>
             <a:fld id="{5DDB1DE6-DCFF-48D7-9CC0-C561253D4BC1}" type="datetimeFigureOut">
               <a:rPr lang="en-CA" smtClean="0"/>
-              <a:t>2017-11-16</a:t>
+              <a:t>2017-11-29</a:t>
             </a:fld>
             <a:endParaRPr lang="en-CA"/>
           </a:p>
@@ -4653,7 +5145,7 @@
           <a:p>
             <a:fld id="{5DDB1DE6-DCFF-48D7-9CC0-C561253D4BC1}" type="datetimeFigureOut">
               <a:rPr lang="en-CA" smtClean="0"/>
-              <a:t>2017-11-16</a:t>
+              <a:t>2017-11-29</a:t>
             </a:fld>
             <a:endParaRPr lang="en-CA"/>
           </a:p>
@@ -4971,7 +5463,7 @@
           <a:p>
             <a:fld id="{5DDB1DE6-DCFF-48D7-9CC0-C561253D4BC1}" type="datetimeFigureOut">
               <a:rPr lang="en-CA" smtClean="0"/>
-              <a:t>2017-11-16</a:t>
+              <a:t>2017-11-29</a:t>
             </a:fld>
             <a:endParaRPr lang="en-CA"/>
           </a:p>
@@ -5283,7 +5775,7 @@
           <a:p>
             <a:fld id="{5DDB1DE6-DCFF-48D7-9CC0-C561253D4BC1}" type="datetimeFigureOut">
               <a:rPr lang="en-CA" smtClean="0"/>
-              <a:t>2017-11-16</a:t>
+              <a:t>2017-11-29</a:t>
             </a:fld>
             <a:endParaRPr lang="en-CA"/>
           </a:p>
@@ -5729,7 +6221,7 @@
           <a:p>
             <a:fld id="{5DDB1DE6-DCFF-48D7-9CC0-C561253D4BC1}" type="datetimeFigureOut">
               <a:rPr lang="en-CA" smtClean="0"/>
-              <a:t>2017-11-16</a:t>
+              <a:t>2017-11-29</a:t>
             </a:fld>
             <a:endParaRPr lang="en-CA"/>
           </a:p>
@@ -5871,7 +6363,7 @@
           <a:p>
             <a:fld id="{5DDB1DE6-DCFF-48D7-9CC0-C561253D4BC1}" type="datetimeFigureOut">
               <a:rPr lang="en-CA" smtClean="0"/>
-              <a:t>2017-11-16</a:t>
+              <a:t>2017-11-29</a:t>
             </a:fld>
             <a:endParaRPr lang="en-CA"/>
           </a:p>
@@ -5990,7 +6482,7 @@
           <a:p>
             <a:fld id="{5DDB1DE6-DCFF-48D7-9CC0-C561253D4BC1}" type="datetimeFigureOut">
               <a:rPr lang="en-CA" smtClean="0"/>
-              <a:t>2017-11-16</a:t>
+              <a:t>2017-11-29</a:t>
             </a:fld>
             <a:endParaRPr lang="en-CA"/>
           </a:p>
@@ -6291,7 +6783,7 @@
           <a:p>
             <a:fld id="{5DDB1DE6-DCFF-48D7-9CC0-C561253D4BC1}" type="datetimeFigureOut">
               <a:rPr lang="en-CA" smtClean="0"/>
-              <a:t>2017-11-16</a:t>
+              <a:t>2017-11-29</a:t>
             </a:fld>
             <a:endParaRPr lang="en-CA"/>
           </a:p>
@@ -6568,7 +7060,7 @@
           <a:p>
             <a:fld id="{5DDB1DE6-DCFF-48D7-9CC0-C561253D4BC1}" type="datetimeFigureOut">
               <a:rPr lang="en-CA" smtClean="0"/>
-              <a:t>2017-11-16</a:t>
+              <a:t>2017-11-29</a:t>
             </a:fld>
             <a:endParaRPr lang="en-CA"/>
           </a:p>
@@ -8411,8 +8903,8 @@
         </p:nvSpPr>
         <p:spPr>
           <a:xfrm>
-            <a:off x="4572000" y="3066053"/>
-            <a:ext cx="3960440" cy="2739211"/>
+            <a:off x="4572000" y="2996953"/>
+            <a:ext cx="4176464" cy="2880320"/>
           </a:xfrm>
           <a:prstGeom prst="rect">
             <a:avLst/>
@@ -8465,8 +8957,8 @@
         </p:nvSpPr>
         <p:spPr>
           <a:xfrm>
-            <a:off x="611560" y="3066053"/>
-            <a:ext cx="3960440" cy="2739211"/>
+            <a:off x="611560" y="2996953"/>
+            <a:ext cx="4176464" cy="2880320"/>
           </a:xfrm>
           <a:prstGeom prst="rect">
             <a:avLst/>
@@ -8523,7 +9015,12 @@
             <p:ph type="title"/>
           </p:nvPr>
         </p:nvSpPr>
-        <p:spPr/>
+        <p:spPr>
+          <a:xfrm>
+            <a:off x="457199" y="245803"/>
+            <a:ext cx="8678487" cy="1201881"/>
+          </a:xfrm>
+        </p:spPr>
         <p:txBody>
           <a:bodyPr/>
           <a:lstStyle/>
@@ -8544,8 +9041,8 @@
         </p:nvSpPr>
         <p:spPr>
           <a:xfrm>
-            <a:off x="4572000" y="329749"/>
-            <a:ext cx="3960440" cy="2739211"/>
+            <a:off x="4572000" y="260649"/>
+            <a:ext cx="4176464" cy="2880320"/>
           </a:xfrm>
           <a:prstGeom prst="rect">
             <a:avLst/>
@@ -8603,8 +9100,8 @@
         </p:nvSpPr>
         <p:spPr>
           <a:xfrm>
-            <a:off x="611560" y="329749"/>
-            <a:ext cx="3960440" cy="2739211"/>
+            <a:off x="611560" y="260649"/>
+            <a:ext cx="4176464" cy="2880320"/>
           </a:xfrm>
           <a:prstGeom prst="rect">
             <a:avLst/>
@@ -8673,8 +9170,8 @@
         </p:blipFill>
         <p:spPr bwMode="auto">
           <a:xfrm>
-            <a:off x="3635896" y="2060847"/>
-            <a:ext cx="1944216" cy="1944217"/>
+            <a:off x="3635896" y="2010451"/>
+            <a:ext cx="2100660" cy="2100661"/>
           </a:xfrm>
           <a:prstGeom prst="rect">
             <a:avLst/>
@@ -9517,15 +10014,19 @@
           <a:p>
             <a:r>
               <a:rPr lang="en-CA" dirty="0" smtClean="0"/>
-              <a:t>Scope and scale of the issue for this Ministry</a:t>
-            </a:r>
+              <a:t>Scope and scale of the issue for this </a:t>
+            </a:r>
+            <a:r>
+              <a:rPr lang="en-CA" dirty="0" smtClean="0"/>
+              <a:t>IMB</a:t>
+            </a:r>
+            <a:endParaRPr lang="en-CA" dirty="0" smtClean="0"/>
           </a:p>
           <a:p>
             <a:r>
               <a:rPr lang="en-CA" dirty="0" smtClean="0"/>
               <a:t>Demonstrations</a:t>
             </a:r>
-            <a:endParaRPr lang="en-CA" dirty="0" smtClean="0"/>
           </a:p>
           <a:p>
             <a:r>
@@ -9924,7 +10425,6 @@
               <a:rPr lang="en-CA" dirty="0" smtClean="0"/>
               <a:t>EOI, RFP, Statements of Work, etc.</a:t>
             </a:r>
-            <a:endParaRPr lang="en-CA" dirty="0" smtClean="0"/>
           </a:p>
           <a:p>
             <a:r>
@@ -10120,7 +10620,7 @@
           <a:p>
             <a:r>
               <a:rPr lang="en-CA" dirty="0" smtClean="0"/>
-              <a:t>MSP</a:t>
+              <a:t>Tools</a:t>
             </a:r>
             <a:endParaRPr lang="en-CA" dirty="0"/>
           </a:p>
@@ -10128,7 +10628,7 @@
       </p:sp>
       <p:sp>
         <p:nvSpPr>
-          <p:cNvPr id="3" name="Content Placeholder 2"/>
+          <p:cNvPr id="4" name="Content Placeholder 3"/>
           <p:cNvSpPr>
             <a:spLocks noGrp="1"/>
           </p:cNvSpPr>
@@ -10141,10 +10641,71 @@
           <a:bodyPr/>
           <a:lstStyle/>
           <a:p>
-            <a:r>
-              <a:rPr lang="en-CA" dirty="0" smtClean="0"/>
-              <a:t>And here’s Greg …</a:t>
-            </a:r>
+            <a:pPr marL="0" indent="0">
+              <a:buNone/>
+            </a:pPr>
+            <a:r>
+              <a:rPr lang="en-CA" dirty="0" smtClean="0"/>
+              <a:t>Several categories of testing tools</a:t>
+            </a:r>
+          </a:p>
+          <a:p>
+            <a:r>
+              <a:rPr lang="en-CA" dirty="0" smtClean="0"/>
+              <a:t>Online (WAVE, </a:t>
+            </a:r>
+            <a:r>
+              <a:rPr lang="en-CA" dirty="0" err="1" smtClean="0"/>
+              <a:t>AChecker</a:t>
+            </a:r>
+            <a:r>
+              <a:rPr lang="en-CA" dirty="0" smtClean="0"/>
+              <a:t>)</a:t>
+            </a:r>
+          </a:p>
+          <a:p>
+            <a:r>
+              <a:rPr lang="en-CA" dirty="0" smtClean="0"/>
+              <a:t>Browser add-ons (WAVE, </a:t>
+            </a:r>
+            <a:r>
+              <a:rPr lang="en-CA" dirty="0" err="1" smtClean="0"/>
+              <a:t>aXe</a:t>
+            </a:r>
+            <a:r>
+              <a:rPr lang="en-CA" dirty="0" smtClean="0"/>
+              <a:t>, Chrome Tools)</a:t>
+            </a:r>
+          </a:p>
+          <a:p>
+            <a:r>
+              <a:rPr lang="en-CA" dirty="0" smtClean="0"/>
+              <a:t>Actual assistive devices (JAWS, NVDA)</a:t>
+            </a:r>
+          </a:p>
+          <a:p>
+            <a:r>
+              <a:rPr lang="en-CA" dirty="0" smtClean="0"/>
+              <a:t>Automation integration (AADT, </a:t>
+            </a:r>
+            <a:r>
+              <a:rPr lang="en-CA" dirty="0" err="1" smtClean="0"/>
+              <a:t>Tanaguru</a:t>
+            </a:r>
+            <a:r>
+              <a:rPr lang="en-CA" dirty="0" smtClean="0"/>
+              <a:t>)</a:t>
+            </a:r>
+          </a:p>
+          <a:p>
+            <a:r>
+              <a:rPr lang="en-CA" dirty="0" smtClean="0"/>
+              <a:t>People – the real deal</a:t>
+            </a:r>
+          </a:p>
+          <a:p>
+            <a:pPr lvl="1"/>
+            <a:endParaRPr lang="en-CA" dirty="0" smtClean="0"/>
           </a:p>
         </p:txBody>
       </p:sp>
@@ -10169,6 +10730,345 @@
 </file>
 
 <file path=ppt/slides/slide26.xml><?xml version="1.0" encoding="utf-8"?>
+<p:sld xmlns:a="http://schemas.openxmlformats.org/drawingml/2006/main" xmlns:r="http://schemas.openxmlformats.org/officeDocument/2006/relationships" xmlns:p="http://schemas.openxmlformats.org/presentationml/2006/main">
+  <p:cSld>
+    <p:spTree>
+      <p:nvGrpSpPr>
+        <p:cNvPr id="1" name=""/>
+        <p:cNvGrpSpPr/>
+        <p:nvPr/>
+      </p:nvGrpSpPr>
+      <p:grpSpPr>
+        <a:xfrm>
+          <a:off x="0" y="0"/>
+          <a:ext cx="0" cy="0"/>
+          <a:chOff x="0" y="0"/>
+          <a:chExt cx="0" cy="0"/>
+        </a:xfrm>
+      </p:grpSpPr>
+      <p:sp>
+        <p:nvSpPr>
+          <p:cNvPr id="2" name="Title 1"/>
+          <p:cNvSpPr>
+            <a:spLocks noGrp="1"/>
+          </p:cNvSpPr>
+          <p:nvPr>
+            <p:ph type="title"/>
+          </p:nvPr>
+        </p:nvSpPr>
+        <p:spPr/>
+        <p:txBody>
+          <a:bodyPr/>
+          <a:lstStyle/>
+          <a:p>
+            <a:r>
+              <a:rPr lang="en-CA" dirty="0" smtClean="0"/>
+              <a:t>Tools - Online</a:t>
+            </a:r>
+            <a:endParaRPr lang="en-CA" dirty="0"/>
+          </a:p>
+        </p:txBody>
+      </p:sp>
+      <p:sp>
+        <p:nvSpPr>
+          <p:cNvPr id="4" name="Content Placeholder 3"/>
+          <p:cNvSpPr>
+            <a:spLocks noGrp="1"/>
+          </p:cNvSpPr>
+          <p:nvPr>
+            <p:ph idx="1"/>
+          </p:nvPr>
+        </p:nvSpPr>
+        <p:spPr/>
+        <p:txBody>
+          <a:bodyPr/>
+          <a:lstStyle/>
+          <a:p>
+            <a:pPr marL="0" indent="0">
+              <a:buNone/>
+            </a:pPr>
+            <a:r>
+              <a:rPr lang="en-CA" dirty="0" smtClean="0"/>
+              <a:t>Several categories of testing tools</a:t>
+            </a:r>
+          </a:p>
+          <a:p>
+            <a:r>
+              <a:rPr lang="en-CA" dirty="0" smtClean="0"/>
+              <a:t>Online (WAVE, </a:t>
+            </a:r>
+            <a:r>
+              <a:rPr lang="en-CA" dirty="0" err="1" smtClean="0"/>
+              <a:t>AChecker</a:t>
+            </a:r>
+            <a:r>
+              <a:rPr lang="en-CA" dirty="0" smtClean="0"/>
+              <a:t>)</a:t>
+            </a:r>
+          </a:p>
+          <a:p>
+            <a:pPr lvl="1"/>
+            <a:r>
+              <a:rPr lang="en-CA" dirty="0" smtClean="0"/>
+              <a:t>Good for one-off checks</a:t>
+            </a:r>
+          </a:p>
+          <a:p>
+            <a:pPr lvl="1"/>
+            <a:r>
+              <a:rPr lang="en-CA" dirty="0" smtClean="0"/>
+              <a:t>Won’t work for material that is secured behind firewalls and logins.</a:t>
+            </a:r>
+          </a:p>
+        </p:txBody>
+      </p:sp>
+    </p:spTree>
+    <p:extLst>
+      <p:ext uri="{BB962C8B-B14F-4D97-AF65-F5344CB8AC3E}">
+        <p14:creationId xmlns:p14="http://schemas.microsoft.com/office/powerpoint/2010/main" val="819622363"/>
+      </p:ext>
+    </p:extLst>
+  </p:cSld>
+  <p:clrMapOvr>
+    <a:masterClrMapping/>
+  </p:clrMapOvr>
+  <p:timing>
+    <p:tnLst>
+      <p:par>
+        <p:cTn id="1" dur="indefinite" restart="never" nodeType="tmRoot"/>
+      </p:par>
+    </p:tnLst>
+  </p:timing>
+</p:sld>
+</file>
+
+<file path=ppt/slides/slide27.xml><?xml version="1.0" encoding="utf-8"?>
+<p:sld xmlns:a="http://schemas.openxmlformats.org/drawingml/2006/main" xmlns:r="http://schemas.openxmlformats.org/officeDocument/2006/relationships" xmlns:p="http://schemas.openxmlformats.org/presentationml/2006/main">
+  <p:cSld>
+    <p:spTree>
+      <p:nvGrpSpPr>
+        <p:cNvPr id="1" name=""/>
+        <p:cNvGrpSpPr/>
+        <p:nvPr/>
+      </p:nvGrpSpPr>
+      <p:grpSpPr>
+        <a:xfrm>
+          <a:off x="0" y="0"/>
+          <a:ext cx="0" cy="0"/>
+          <a:chOff x="0" y="0"/>
+          <a:chExt cx="0" cy="0"/>
+        </a:xfrm>
+      </p:grpSpPr>
+      <p:sp>
+        <p:nvSpPr>
+          <p:cNvPr id="2" name="Title 1"/>
+          <p:cNvSpPr>
+            <a:spLocks noGrp="1"/>
+          </p:cNvSpPr>
+          <p:nvPr>
+            <p:ph type="title"/>
+          </p:nvPr>
+        </p:nvSpPr>
+        <p:spPr/>
+        <p:txBody>
+          <a:bodyPr/>
+          <a:lstStyle/>
+          <a:p>
+            <a:r>
+              <a:rPr lang="en-CA" dirty="0" smtClean="0"/>
+              <a:t>Tools – Add-ons</a:t>
+            </a:r>
+            <a:endParaRPr lang="en-CA" dirty="0"/>
+          </a:p>
+        </p:txBody>
+      </p:sp>
+      <p:sp>
+        <p:nvSpPr>
+          <p:cNvPr id="4" name="Content Placeholder 3"/>
+          <p:cNvSpPr>
+            <a:spLocks noGrp="1"/>
+          </p:cNvSpPr>
+          <p:nvPr>
+            <p:ph idx="1"/>
+          </p:nvPr>
+        </p:nvSpPr>
+        <p:spPr/>
+        <p:txBody>
+          <a:bodyPr/>
+          <a:lstStyle/>
+          <a:p>
+            <a:r>
+              <a:rPr lang="en-CA" dirty="0" smtClean="0"/>
+              <a:t>Browser add-ons (WAVE, </a:t>
+            </a:r>
+            <a:r>
+              <a:rPr lang="en-CA" dirty="0" err="1" smtClean="0"/>
+              <a:t>aXe</a:t>
+            </a:r>
+            <a:r>
+              <a:rPr lang="en-CA" dirty="0" smtClean="0"/>
+              <a:t>, Chrome Tools)</a:t>
+            </a:r>
+          </a:p>
+          <a:p>
+            <a:pPr lvl="1"/>
+            <a:r>
+              <a:rPr lang="en-CA" dirty="0" smtClean="0"/>
+              <a:t>Better for one off</a:t>
+            </a:r>
+          </a:p>
+          <a:p>
+            <a:pPr lvl="1"/>
+            <a:r>
+              <a:rPr lang="en-CA" dirty="0" smtClean="0"/>
+              <a:t>More of these available</a:t>
+            </a:r>
+          </a:p>
+          <a:p>
+            <a:pPr lvl="1"/>
+            <a:r>
+              <a:rPr lang="en-CA" dirty="0" smtClean="0"/>
+              <a:t>Most are free</a:t>
+            </a:r>
+          </a:p>
+          <a:p>
+            <a:pPr lvl="1"/>
+            <a:r>
+              <a:rPr lang="en-CA" dirty="0" smtClean="0"/>
+              <a:t>Most are currently best used with Chrome</a:t>
+            </a:r>
+          </a:p>
+          <a:p>
+            <a:pPr marL="457200" lvl="1" indent="0">
+              <a:buNone/>
+            </a:pPr>
+            <a:endParaRPr lang="en-CA" dirty="0" smtClean="0"/>
+          </a:p>
+        </p:txBody>
+      </p:sp>
+    </p:spTree>
+    <p:extLst>
+      <p:ext uri="{BB962C8B-B14F-4D97-AF65-F5344CB8AC3E}">
+        <p14:creationId xmlns:p14="http://schemas.microsoft.com/office/powerpoint/2010/main" val="856081837"/>
+      </p:ext>
+    </p:extLst>
+  </p:cSld>
+  <p:clrMapOvr>
+    <a:masterClrMapping/>
+  </p:clrMapOvr>
+  <p:timing>
+    <p:tnLst>
+      <p:par>
+        <p:cTn id="1" dur="indefinite" restart="never" nodeType="tmRoot"/>
+      </p:par>
+    </p:tnLst>
+  </p:timing>
+</p:sld>
+</file>
+
+<file path=ppt/slides/slide28.xml><?xml version="1.0" encoding="utf-8"?>
+<p:sld xmlns:a="http://schemas.openxmlformats.org/drawingml/2006/main" xmlns:r="http://schemas.openxmlformats.org/officeDocument/2006/relationships" xmlns:p="http://schemas.openxmlformats.org/presentationml/2006/main">
+  <p:cSld>
+    <p:spTree>
+      <p:nvGrpSpPr>
+        <p:cNvPr id="1" name=""/>
+        <p:cNvGrpSpPr/>
+        <p:nvPr/>
+      </p:nvGrpSpPr>
+      <p:grpSpPr>
+        <a:xfrm>
+          <a:off x="0" y="0"/>
+          <a:ext cx="0" cy="0"/>
+          <a:chOff x="0" y="0"/>
+          <a:chExt cx="0" cy="0"/>
+        </a:xfrm>
+      </p:grpSpPr>
+      <p:sp>
+        <p:nvSpPr>
+          <p:cNvPr id="2" name="Title 1"/>
+          <p:cNvSpPr>
+            <a:spLocks noGrp="1"/>
+          </p:cNvSpPr>
+          <p:nvPr>
+            <p:ph type="title"/>
+          </p:nvPr>
+        </p:nvSpPr>
+        <p:spPr/>
+        <p:txBody>
+          <a:bodyPr/>
+          <a:lstStyle/>
+          <a:p>
+            <a:r>
+              <a:rPr lang="en-CA" dirty="0" smtClean="0"/>
+              <a:t>Tools – Real Assistive Devices</a:t>
+            </a:r>
+            <a:endParaRPr lang="en-CA" dirty="0"/>
+          </a:p>
+        </p:txBody>
+      </p:sp>
+      <p:sp>
+        <p:nvSpPr>
+          <p:cNvPr id="4" name="Content Placeholder 3"/>
+          <p:cNvSpPr>
+            <a:spLocks noGrp="1"/>
+          </p:cNvSpPr>
+          <p:nvPr>
+            <p:ph idx="1"/>
+          </p:nvPr>
+        </p:nvSpPr>
+        <p:spPr/>
+        <p:txBody>
+          <a:bodyPr>
+            <a:normAutofit/>
+          </a:bodyPr>
+          <a:lstStyle/>
+          <a:p>
+            <a:r>
+              <a:rPr lang="en-CA" dirty="0" smtClean="0"/>
+              <a:t>Actual assistive devices </a:t>
+            </a:r>
+          </a:p>
+          <a:p>
+            <a:r>
+              <a:rPr lang="en-CA" dirty="0" smtClean="0"/>
+              <a:t>Most require Windows because they hook into it’s built in assistive tech libraries</a:t>
+            </a:r>
+          </a:p>
+          <a:p>
+            <a:r>
+              <a:rPr lang="en-CA" dirty="0" smtClean="0"/>
+              <a:t>Require expertise to use but can be learned enough for rudimentary testing</a:t>
+            </a:r>
+          </a:p>
+          <a:p>
+            <a:pPr marL="914400" lvl="2" indent="0">
+              <a:buNone/>
+            </a:pPr>
+            <a:endParaRPr lang="en-CA" dirty="0" smtClean="0"/>
+          </a:p>
+        </p:txBody>
+      </p:sp>
+    </p:spTree>
+    <p:extLst>
+      <p:ext uri="{BB962C8B-B14F-4D97-AF65-F5344CB8AC3E}">
+        <p14:creationId xmlns:p14="http://schemas.microsoft.com/office/powerpoint/2010/main" val="2064718727"/>
+      </p:ext>
+    </p:extLst>
+  </p:cSld>
+  <p:clrMapOvr>
+    <a:masterClrMapping/>
+  </p:clrMapOvr>
+  <p:timing>
+    <p:tnLst>
+      <p:par>
+        <p:cTn id="1" dur="indefinite" restart="never" nodeType="tmRoot"/>
+      </p:par>
+    </p:tnLst>
+  </p:timing>
+</p:sld>
+</file>
+
+<file path=ppt/slides/slide29.xml><?xml version="1.0" encoding="utf-8"?>
 <p:sld xmlns:a="http://schemas.openxmlformats.org/drawingml/2006/main" xmlns:r="http://schemas.openxmlformats.org/officeDocument/2006/relationships" xmlns:p="http://schemas.openxmlformats.org/presentationml/2006/main">
   <p:cSld>
     <p:spTree>
@@ -10985,7 +11885,7 @@
         </p:nvSpPr>
         <p:spPr>
           <a:xfrm>
-            <a:off x="2555776" y="1916832"/>
+            <a:off x="683568" y="2368078"/>
             <a:ext cx="4341894" cy="2553891"/>
           </a:xfrm>
           <a:prstGeom prst="roundRect">
@@ -13386,6 +14286,21 @@
 </file>
 
 <file path=customXml/item1.xml><?xml version="1.0" encoding="utf-8"?>
+<p:properties xmlns:p="http://schemas.microsoft.com/office/2006/metadata/properties" xmlns:xsi="http://www.w3.org/2001/XMLSchema-instance" xmlns:pc="http://schemas.microsoft.com/office/infopath/2007/PartnerControls">
+  <documentManagement/>
+</p:properties>
+</file>
+
+<file path=customXml/item2.xml><?xml version="1.0" encoding="utf-8"?>
+<?mso-contentType ?>
+<FormTemplates xmlns="http://schemas.microsoft.com/sharepoint/v3/contenttype/forms">
+  <Display>DocumentLibraryForm</Display>
+  <Edit>DocumentLibraryForm</Edit>
+  <New>DocumentLibraryForm</New>
+</FormTemplates>
+</file>
+
+<file path=customXml/item3.xml><?xml version="1.0" encoding="utf-8"?>
 <ct:contentTypeSchema xmlns:ct="http://schemas.microsoft.com/office/2006/metadata/contentType" xmlns:ma="http://schemas.microsoft.com/office/2006/metadata/properties/metaAttributes" ct:_="" ma:_="" ma:contentTypeName="Document" ma:contentTypeID="0x01010010B8B88E69DC084DB4454BD303FC84A8" ma:contentTypeVersion="0" ma:contentTypeDescription="Create a new document." ma:contentTypeScope="" ma:versionID="1ecfcc0e9dc7a70c6e4f3ef885d95856">
   <xsd:schema xmlns:xsd="http://www.w3.org/2001/XMLSchema" xmlns:xs="http://www.w3.org/2001/XMLSchema" xmlns:p="http://schemas.microsoft.com/office/2006/metadata/properties" targetNamespace="http://schemas.microsoft.com/office/2006/metadata/properties" ma:root="true" ma:fieldsID="1648c5e0ecb366114e52100a5efdb160">
     <xsd:element name="properties">
@@ -13499,32 +14414,10 @@
 </ct:contentTypeSchema>
 </file>
 
-<file path=customXml/item2.xml><?xml version="1.0" encoding="utf-8"?>
-<?mso-contentType ?>
-<FormTemplates xmlns="http://schemas.microsoft.com/sharepoint/v3/contenttype/forms">
-  <Display>DocumentLibraryForm</Display>
-  <Edit>DocumentLibraryForm</Edit>
-  <New>DocumentLibraryForm</New>
-</FormTemplates>
-</file>
-
-<file path=customXml/item3.xml><?xml version="1.0" encoding="utf-8"?>
-<p:properties xmlns:p="http://schemas.microsoft.com/office/2006/metadata/properties" xmlns:xsi="http://www.w3.org/2001/XMLSchema-instance" xmlns:pc="http://schemas.microsoft.com/office/infopath/2007/PartnerControls">
-  <documentManagement/>
-</p:properties>
-</file>
-
 <file path=customXml/itemProps1.xml><?xml version="1.0" encoding="utf-8"?>
-<ds:datastoreItem xmlns:ds="http://schemas.openxmlformats.org/officeDocument/2006/customXml" ds:itemID="{C8F7BCDC-42FC-41AB-A454-1101C63034CE}">
+<ds:datastoreItem xmlns:ds="http://schemas.openxmlformats.org/officeDocument/2006/customXml" ds:itemID="{5AAF29FC-63F9-4EC0-A194-DB5A0CAAC470}">
   <ds:schemaRefs>
-    <ds:schemaRef ds:uri="http://schemas.microsoft.com/office/2006/metadata/contentType"/>
-    <ds:schemaRef ds:uri="http://schemas.microsoft.com/office/2006/metadata/properties/metaAttributes"/>
-    <ds:schemaRef ds:uri="http://www.w3.org/2001/XMLSchema"/>
     <ds:schemaRef ds:uri="http://schemas.microsoft.com/office/2006/metadata/properties"/>
-    <ds:schemaRef ds:uri="http://schemas.openxmlformats.org/package/2006/metadata/core-properties"/>
-    <ds:schemaRef ds:uri="http://purl.org/dc/elements/1.1/"/>
-    <ds:schemaRef ds:uri="http://purl.org/dc/terms/"/>
-    <ds:schemaRef ds:uri="http://schemas.microsoft.com/internal/obd"/>
     <ds:schemaRef ds:uri="http://schemas.microsoft.com/office/infopath/2007/PartnerControls"/>
   </ds:schemaRefs>
 </ds:datastoreItem>
@@ -13539,9 +14432,16 @@
 </file>
 
 <file path=customXml/itemProps3.xml><?xml version="1.0" encoding="utf-8"?>
-<ds:datastoreItem xmlns:ds="http://schemas.openxmlformats.org/officeDocument/2006/customXml" ds:itemID="{5AAF29FC-63F9-4EC0-A194-DB5A0CAAC470}">
+<ds:datastoreItem xmlns:ds="http://schemas.openxmlformats.org/officeDocument/2006/customXml" ds:itemID="{C8F7BCDC-42FC-41AB-A454-1101C63034CE}">
   <ds:schemaRefs>
+    <ds:schemaRef ds:uri="http://schemas.microsoft.com/office/2006/metadata/contentType"/>
+    <ds:schemaRef ds:uri="http://schemas.microsoft.com/office/2006/metadata/properties/metaAttributes"/>
+    <ds:schemaRef ds:uri="http://www.w3.org/2001/XMLSchema"/>
     <ds:schemaRef ds:uri="http://schemas.microsoft.com/office/2006/metadata/properties"/>
+    <ds:schemaRef ds:uri="http://schemas.openxmlformats.org/package/2006/metadata/core-properties"/>
+    <ds:schemaRef ds:uri="http://purl.org/dc/elements/1.1/"/>
+    <ds:schemaRef ds:uri="http://purl.org/dc/terms/"/>
+    <ds:schemaRef ds:uri="http://schemas.microsoft.com/internal/obd"/>
     <ds:schemaRef ds:uri="http://schemas.microsoft.com/office/infopath/2007/PartnerControls"/>
   </ds:schemaRefs>
 </ds:datastoreItem>

</xml_diff>